<commit_message>
Diapo - partie Méthode implémentée
</commit_message>
<xml_diff>
--- a/Soutenance.pptx
+++ b/Soutenance.pptx
@@ -5,14 +5,22 @@
     <p:sldMasterId id="2147483648" r:id="rId1"/>
   </p:sldMasterIdLst>
   <p:notesMasterIdLst>
-    <p:notesMasterId r:id="rId4"/>
+    <p:notesMasterId r:id="rId12"/>
   </p:notesMasterIdLst>
   <p:handoutMasterIdLst>
-    <p:handoutMasterId r:id="rId5"/>
+    <p:handoutMasterId r:id="rId13"/>
   </p:handoutMasterIdLst>
   <p:sldIdLst>
     <p:sldId id="256" r:id="rId2"/>
     <p:sldId id="257" r:id="rId3"/>
+    <p:sldId id="262" r:id="rId4"/>
+    <p:sldId id="264" r:id="rId5"/>
+    <p:sldId id="258" r:id="rId6"/>
+    <p:sldId id="259" r:id="rId7"/>
+    <p:sldId id="260" r:id="rId8"/>
+    <p:sldId id="261" r:id="rId9"/>
+    <p:sldId id="263" r:id="rId10"/>
+    <p:sldId id="265" r:id="rId11"/>
   </p:sldIdLst>
   <p:sldSz cx="9144000" cy="6858000" type="screen4x3"/>
   <p:notesSz cx="6858000" cy="9144000"/>
@@ -113,7 +121,7 @@
   </p:defaultTextStyle>
   <p:extLst>
     <p:ext uri="{EFAFB233-063F-42B5-8137-9DF3F51BA10A}">
-      <p15:sldGuideLst xmlns:p15="http://schemas.microsoft.com/office/powerpoint/2012/main">
+      <p15:sldGuideLst xmlns="" xmlns:p15="http://schemas.microsoft.com/office/powerpoint/2012/main">
         <p15:guide id="1" orient="horz" pos="2160">
           <p15:clr>
             <a:srgbClr val="A4A3A4"/>
@@ -127,7 +135,7 @@
       </p15:sldGuideLst>
     </p:ext>
     <p:ext uri="{2D200454-40CA-4A62-9FC3-DE9A4176ACB9}">
-      <p15:notesGuideLst xmlns:p15="http://schemas.microsoft.com/office/powerpoint/2012/main">
+      <p15:notesGuideLst xmlns="" xmlns:p15="http://schemas.microsoft.com/office/powerpoint/2012/main">
         <p15:guide id="1" orient="horz" pos="2880">
           <p15:clr>
             <a:srgbClr val="A4A3A4"/>
@@ -226,6 +234,7 @@
           <a:p>
             <a:fld id="{21F2E272-ACF6-4201-A52C-0DF70A29A32C}" type="datetimeFigureOut">
               <a:rPr lang="fr-FR" smtClean="0"/>
+              <a:pPr/>
               <a:t>07/01/2019</a:t>
             </a:fld>
             <a:endParaRPr lang="fr-FR"/>
@@ -292,6 +301,7 @@
           <a:p>
             <a:fld id="{F7D3F55A-FC20-4A81-9837-B42E226C1519}" type="slidenum">
               <a:rPr lang="fr-FR" smtClean="0"/>
+              <a:pPr/>
               <a:t>‹N°›</a:t>
             </a:fld>
             <a:endParaRPr lang="fr-FR"/>
@@ -301,7 +311,7 @@
     </p:spTree>
     <p:extLst>
       <p:ext uri="{BB962C8B-B14F-4D97-AF65-F5344CB8AC3E}">
-        <p14:creationId xmlns:p14="http://schemas.microsoft.com/office/powerpoint/2010/main" val="1048558156"/>
+        <p14:creationId xmlns="" xmlns:p14="http://schemas.microsoft.com/office/powerpoint/2010/main" val="1048558156"/>
       </p:ext>
     </p:extLst>
   </p:cSld>
@@ -391,6 +401,7 @@
           <a:p>
             <a:fld id="{9490309D-EA54-4870-8246-74302B8CC236}" type="datetimeFigureOut">
               <a:rPr lang="fr-FR" smtClean="0"/>
+              <a:pPr/>
               <a:t>07/01/2019</a:t>
             </a:fld>
             <a:endParaRPr lang="fr-FR"/>
@@ -551,6 +562,7 @@
           <a:p>
             <a:fld id="{6A89ABAB-96B0-4C79-8E68-F9EFE75ADDF7}" type="slidenum">
               <a:rPr lang="fr-FR" smtClean="0"/>
+              <a:pPr/>
               <a:t>‹N°›</a:t>
             </a:fld>
             <a:endParaRPr lang="fr-FR"/>
@@ -560,7 +572,7 @@
     </p:spTree>
     <p:extLst>
       <p:ext uri="{BB962C8B-B14F-4D97-AF65-F5344CB8AC3E}">
-        <p14:creationId xmlns:p14="http://schemas.microsoft.com/office/powerpoint/2010/main" val="4022948044"/>
+        <p14:creationId xmlns="" xmlns:p14="http://schemas.microsoft.com/office/powerpoint/2010/main" val="4022948044"/>
       </p:ext>
     </p:extLst>
   </p:cSld>
@@ -910,7 +922,7 @@
           <p:cNvPr id="8" name="Espace réservé de la date 3">
             <a:extLst>
               <a:ext uri="{FF2B5EF4-FFF2-40B4-BE49-F238E27FC236}">
-                <a16:creationId xmlns:a16="http://schemas.microsoft.com/office/drawing/2014/main" id="{157115E0-CA3F-4AC8-9636-275F5CD9564F}"/>
+                <a16:creationId xmlns="" xmlns:a16="http://schemas.microsoft.com/office/drawing/2014/main" id="{157115E0-CA3F-4AC8-9636-275F5CD9564F}"/>
               </a:ext>
             </a:extLst>
           </p:cNvPr>
@@ -965,7 +977,7 @@
           <p:cNvPr id="11" name="Espace réservé du pied de page 4">
             <a:extLst>
               <a:ext uri="{FF2B5EF4-FFF2-40B4-BE49-F238E27FC236}">
-                <a16:creationId xmlns:a16="http://schemas.microsoft.com/office/drawing/2014/main" id="{76094FB1-7A0D-458A-B2C1-C8F9B962C22B}"/>
+                <a16:creationId xmlns="" xmlns:a16="http://schemas.microsoft.com/office/drawing/2014/main" id="{76094FB1-7A0D-458A-B2C1-C8F9B962C22B}"/>
               </a:ext>
             </a:extLst>
           </p:cNvPr>
@@ -1004,6 +1016,10 @@
             <a:r>
               <a:rPr lang="fr-FR" dirty="0" err="1"/>
               <a:t>Moncan</a:t>
+            </a:r>
+            <a:r>
+              <a:rPr lang="fr-FR" dirty="0"/>
+              <a:t/>
             </a:r>
             <a:br>
               <a:rPr lang="fr-FR" dirty="0"/>
@@ -1205,6 +1221,7 @@
           <a:p>
             <a:fld id="{09390BE9-E4CD-414E-A8A9-9535CDDB3176}" type="slidenum">
               <a:rPr lang="fr-FR" smtClean="0"/>
+              <a:pPr/>
               <a:t>‹N°›</a:t>
             </a:fld>
             <a:endParaRPr lang="fr-FR"/>
@@ -1390,6 +1407,7 @@
           <a:p>
             <a:fld id="{09390BE9-E4CD-414E-A8A9-9535CDDB3176}" type="slidenum">
               <a:rPr lang="fr-FR" smtClean="0"/>
+              <a:pPr/>
               <a:t>‹N°›</a:t>
             </a:fld>
             <a:endParaRPr lang="fr-FR"/>
@@ -1570,7 +1588,7 @@
           <p:cNvPr id="8" name="Espace réservé de la date 3">
             <a:extLst>
               <a:ext uri="{FF2B5EF4-FFF2-40B4-BE49-F238E27FC236}">
-                <a16:creationId xmlns:a16="http://schemas.microsoft.com/office/drawing/2014/main" id="{E37A9900-8B64-4FF5-B804-6951E13C627B}"/>
+                <a16:creationId xmlns="" xmlns:a16="http://schemas.microsoft.com/office/drawing/2014/main" id="{E37A9900-8B64-4FF5-B804-6951E13C627B}"/>
               </a:ext>
             </a:extLst>
           </p:cNvPr>
@@ -1625,7 +1643,7 @@
           <p:cNvPr id="9" name="Espace réservé du pied de page 4">
             <a:extLst>
               <a:ext uri="{FF2B5EF4-FFF2-40B4-BE49-F238E27FC236}">
-                <a16:creationId xmlns:a16="http://schemas.microsoft.com/office/drawing/2014/main" id="{4CEFEC68-8B02-4B4C-9FBD-CA8EE81FA82B}"/>
+                <a16:creationId xmlns="" xmlns:a16="http://schemas.microsoft.com/office/drawing/2014/main" id="{4CEFEC68-8B02-4B4C-9FBD-CA8EE81FA82B}"/>
               </a:ext>
             </a:extLst>
           </p:cNvPr>
@@ -1664,6 +1682,10 @@
             <a:r>
               <a:rPr lang="fr-FR" dirty="0" err="1"/>
               <a:t>Moncan</a:t>
+            </a:r>
+            <a:r>
+              <a:rPr lang="fr-FR" dirty="0"/>
+              <a:t/>
             </a:r>
             <a:br>
               <a:rPr lang="fr-FR" dirty="0"/>
@@ -1936,7 +1958,7 @@
           <p:cNvPr id="8" name="Espace réservé de la date 3">
             <a:extLst>
               <a:ext uri="{FF2B5EF4-FFF2-40B4-BE49-F238E27FC236}">
-                <a16:creationId xmlns:a16="http://schemas.microsoft.com/office/drawing/2014/main" id="{4CB06608-839F-4A4E-BB93-A43DE0016828}"/>
+                <a16:creationId xmlns="" xmlns:a16="http://schemas.microsoft.com/office/drawing/2014/main" id="{4CB06608-839F-4A4E-BB93-A43DE0016828}"/>
               </a:ext>
             </a:extLst>
           </p:cNvPr>
@@ -1991,7 +2013,7 @@
           <p:cNvPr id="9" name="Espace réservé du pied de page 4">
             <a:extLst>
               <a:ext uri="{FF2B5EF4-FFF2-40B4-BE49-F238E27FC236}">
-                <a16:creationId xmlns:a16="http://schemas.microsoft.com/office/drawing/2014/main" id="{C41C4845-7AB1-4323-B6AF-B93ADEB2CDA4}"/>
+                <a16:creationId xmlns="" xmlns:a16="http://schemas.microsoft.com/office/drawing/2014/main" id="{C41C4845-7AB1-4323-B6AF-B93ADEB2CDA4}"/>
               </a:ext>
             </a:extLst>
           </p:cNvPr>
@@ -2030,6 +2052,10 @@
             <a:r>
               <a:rPr lang="fr-FR" dirty="0" err="1"/>
               <a:t>Moncan</a:t>
+            </a:r>
+            <a:r>
+              <a:rPr lang="fr-FR" dirty="0"/>
+              <a:t/>
             </a:r>
             <a:br>
               <a:rPr lang="fr-FR" dirty="0"/>
@@ -2348,7 +2374,7 @@
           <p:cNvPr id="12" name="Espace réservé de la date 3">
             <a:extLst>
               <a:ext uri="{FF2B5EF4-FFF2-40B4-BE49-F238E27FC236}">
-                <a16:creationId xmlns:a16="http://schemas.microsoft.com/office/drawing/2014/main" id="{7B2CEFFE-E93B-4777-B89C-DFBFE50A6217}"/>
+                <a16:creationId xmlns="" xmlns:a16="http://schemas.microsoft.com/office/drawing/2014/main" id="{7B2CEFFE-E93B-4777-B89C-DFBFE50A6217}"/>
               </a:ext>
             </a:extLst>
           </p:cNvPr>
@@ -2403,7 +2429,7 @@
           <p:cNvPr id="13" name="Espace réservé du pied de page 4">
             <a:extLst>
               <a:ext uri="{FF2B5EF4-FFF2-40B4-BE49-F238E27FC236}">
-                <a16:creationId xmlns:a16="http://schemas.microsoft.com/office/drawing/2014/main" id="{EF5AA0FA-D908-4FEF-9932-CC0AC453FE14}"/>
+                <a16:creationId xmlns="" xmlns:a16="http://schemas.microsoft.com/office/drawing/2014/main" id="{EF5AA0FA-D908-4FEF-9932-CC0AC453FE14}"/>
               </a:ext>
             </a:extLst>
           </p:cNvPr>
@@ -2442,6 +2468,10 @@
             <a:r>
               <a:rPr lang="fr-FR" dirty="0" err="1"/>
               <a:t>Moncan</a:t>
+            </a:r>
+            <a:r>
+              <a:rPr lang="fr-FR" dirty="0"/>
+              <a:t/>
             </a:r>
             <a:br>
               <a:rPr lang="fr-FR" dirty="0"/>
@@ -2890,7 +2920,7 @@
           <p:cNvPr id="14" name="Espace réservé de la date 3">
             <a:extLst>
               <a:ext uri="{FF2B5EF4-FFF2-40B4-BE49-F238E27FC236}">
-                <a16:creationId xmlns:a16="http://schemas.microsoft.com/office/drawing/2014/main" id="{5372BDA7-9878-4709-AB49-91EA80D8220F}"/>
+                <a16:creationId xmlns="" xmlns:a16="http://schemas.microsoft.com/office/drawing/2014/main" id="{5372BDA7-9878-4709-AB49-91EA80D8220F}"/>
               </a:ext>
             </a:extLst>
           </p:cNvPr>
@@ -2945,7 +2975,7 @@
           <p:cNvPr id="15" name="Espace réservé du pied de page 4">
             <a:extLst>
               <a:ext uri="{FF2B5EF4-FFF2-40B4-BE49-F238E27FC236}">
-                <a16:creationId xmlns:a16="http://schemas.microsoft.com/office/drawing/2014/main" id="{4924B80B-041A-4ECA-AD5F-AB867B4E7AE6}"/>
+                <a16:creationId xmlns="" xmlns:a16="http://schemas.microsoft.com/office/drawing/2014/main" id="{4924B80B-041A-4ECA-AD5F-AB867B4E7AE6}"/>
               </a:ext>
             </a:extLst>
           </p:cNvPr>
@@ -2984,6 +3014,10 @@
             <a:r>
               <a:rPr lang="fr-FR" dirty="0" err="1"/>
               <a:t>Moncan</a:t>
+            </a:r>
+            <a:r>
+              <a:rPr lang="fr-FR" dirty="0"/>
+              <a:t/>
             </a:r>
             <a:br>
               <a:rPr lang="fr-FR" dirty="0"/>
@@ -3134,7 +3168,7 @@
           <p:cNvPr id="10" name="Espace réservé de la date 3">
             <a:extLst>
               <a:ext uri="{FF2B5EF4-FFF2-40B4-BE49-F238E27FC236}">
-                <a16:creationId xmlns:a16="http://schemas.microsoft.com/office/drawing/2014/main" id="{0DEEAD28-5791-4128-95D9-3F2B04FAA46F}"/>
+                <a16:creationId xmlns="" xmlns:a16="http://schemas.microsoft.com/office/drawing/2014/main" id="{0DEEAD28-5791-4128-95D9-3F2B04FAA46F}"/>
               </a:ext>
             </a:extLst>
           </p:cNvPr>
@@ -3189,7 +3223,7 @@
           <p:cNvPr id="11" name="Espace réservé du pied de page 4">
             <a:extLst>
               <a:ext uri="{FF2B5EF4-FFF2-40B4-BE49-F238E27FC236}">
-                <a16:creationId xmlns:a16="http://schemas.microsoft.com/office/drawing/2014/main" id="{AF71041A-4A34-48C5-911F-94E99561E6BD}"/>
+                <a16:creationId xmlns="" xmlns:a16="http://schemas.microsoft.com/office/drawing/2014/main" id="{AF71041A-4A34-48C5-911F-94E99561E6BD}"/>
               </a:ext>
             </a:extLst>
           </p:cNvPr>
@@ -3228,6 +3262,10 @@
             <a:r>
               <a:rPr lang="fr-FR" dirty="0" err="1"/>
               <a:t>Moncan</a:t>
+            </a:r>
+            <a:r>
+              <a:rPr lang="fr-FR" dirty="0"/>
+              <a:t/>
             </a:r>
             <a:br>
               <a:rPr lang="fr-FR" dirty="0"/>
@@ -3334,7 +3372,7 @@
           <p:cNvPr id="5" name="Espace réservé de la date 3">
             <a:extLst>
               <a:ext uri="{FF2B5EF4-FFF2-40B4-BE49-F238E27FC236}">
-                <a16:creationId xmlns:a16="http://schemas.microsoft.com/office/drawing/2014/main" id="{A2839C41-E055-4FCA-9352-F0E8DBF5786B}"/>
+                <a16:creationId xmlns="" xmlns:a16="http://schemas.microsoft.com/office/drawing/2014/main" id="{A2839C41-E055-4FCA-9352-F0E8DBF5786B}"/>
               </a:ext>
             </a:extLst>
           </p:cNvPr>
@@ -3389,7 +3427,7 @@
           <p:cNvPr id="6" name="Espace réservé du pied de page 4">
             <a:extLst>
               <a:ext uri="{FF2B5EF4-FFF2-40B4-BE49-F238E27FC236}">
-                <a16:creationId xmlns:a16="http://schemas.microsoft.com/office/drawing/2014/main" id="{64C45591-49EA-470F-94FC-31B132DE3844}"/>
+                <a16:creationId xmlns="" xmlns:a16="http://schemas.microsoft.com/office/drawing/2014/main" id="{64C45591-49EA-470F-94FC-31B132DE3844}"/>
               </a:ext>
             </a:extLst>
           </p:cNvPr>
@@ -3428,6 +3466,10 @@
             <a:r>
               <a:rPr lang="fr-FR" dirty="0" err="1"/>
               <a:t>Moncan</a:t>
+            </a:r>
+            <a:r>
+              <a:rPr lang="fr-FR" dirty="0"/>
+              <a:t/>
             </a:r>
             <a:br>
               <a:rPr lang="fr-FR" dirty="0"/>
@@ -3714,7 +3756,7 @@
           <p:cNvPr id="11" name="Espace réservé de la date 3">
             <a:extLst>
               <a:ext uri="{FF2B5EF4-FFF2-40B4-BE49-F238E27FC236}">
-                <a16:creationId xmlns:a16="http://schemas.microsoft.com/office/drawing/2014/main" id="{9BD95D9F-FF11-429C-BF31-325F20942794}"/>
+                <a16:creationId xmlns="" xmlns:a16="http://schemas.microsoft.com/office/drawing/2014/main" id="{9BD95D9F-FF11-429C-BF31-325F20942794}"/>
               </a:ext>
             </a:extLst>
           </p:cNvPr>
@@ -3769,7 +3811,7 @@
           <p:cNvPr id="12" name="Espace réservé du pied de page 4">
             <a:extLst>
               <a:ext uri="{FF2B5EF4-FFF2-40B4-BE49-F238E27FC236}">
-                <a16:creationId xmlns:a16="http://schemas.microsoft.com/office/drawing/2014/main" id="{27967C14-7A23-44A0-A73F-BC62B499E300}"/>
+                <a16:creationId xmlns="" xmlns:a16="http://schemas.microsoft.com/office/drawing/2014/main" id="{27967C14-7A23-44A0-A73F-BC62B499E300}"/>
               </a:ext>
             </a:extLst>
           </p:cNvPr>
@@ -3808,6 +3850,10 @@
             <a:r>
               <a:rPr lang="fr-FR" dirty="0" err="1"/>
               <a:t>Moncan</a:t>
+            </a:r>
+            <a:r>
+              <a:rPr lang="fr-FR" dirty="0"/>
+              <a:t/>
             </a:r>
             <a:br>
               <a:rPr lang="fr-FR" dirty="0"/>
@@ -4071,7 +4117,7 @@
           <p:cNvPr id="11" name="Espace réservé de la date 3">
             <a:extLst>
               <a:ext uri="{FF2B5EF4-FFF2-40B4-BE49-F238E27FC236}">
-                <a16:creationId xmlns:a16="http://schemas.microsoft.com/office/drawing/2014/main" id="{62A56FFC-0F56-477B-AEA6-8E7459CE5237}"/>
+                <a16:creationId xmlns="" xmlns:a16="http://schemas.microsoft.com/office/drawing/2014/main" id="{62A56FFC-0F56-477B-AEA6-8E7459CE5237}"/>
               </a:ext>
             </a:extLst>
           </p:cNvPr>
@@ -4126,7 +4172,7 @@
           <p:cNvPr id="12" name="Espace réservé du pied de page 4">
             <a:extLst>
               <a:ext uri="{FF2B5EF4-FFF2-40B4-BE49-F238E27FC236}">
-                <a16:creationId xmlns:a16="http://schemas.microsoft.com/office/drawing/2014/main" id="{250E0164-CD9F-486D-8662-10654527DB7A}"/>
+                <a16:creationId xmlns="" xmlns:a16="http://schemas.microsoft.com/office/drawing/2014/main" id="{250E0164-CD9F-486D-8662-10654527DB7A}"/>
               </a:ext>
             </a:extLst>
           </p:cNvPr>
@@ -4165,6 +4211,10 @@
             <a:r>
               <a:rPr lang="fr-FR" dirty="0" err="1"/>
               <a:t>Moncan</a:t>
+            </a:r>
+            <a:r>
+              <a:rPr lang="fr-FR" dirty="0"/>
+              <a:t/>
             </a:r>
             <a:br>
               <a:rPr lang="fr-FR" dirty="0"/>
@@ -4210,7 +4260,7 @@
   <p:cSld>
     <p:bg>
       <p:bgRef idx="1001">
-        <a:schemeClr val="bg2"/>
+        <a:schemeClr val="bg1"/>
       </p:bgRef>
     </p:bg>
     <p:spTree>
@@ -4618,6 +4668,10 @@
             <a:r>
               <a:rPr lang="fr-FR" dirty="0" err="1"/>
               <a:t>Moncan</a:t>
+            </a:r>
+            <a:r>
+              <a:rPr lang="fr-FR" dirty="0"/>
+              <a:t/>
             </a:r>
             <a:br>
               <a:rPr lang="fr-FR" dirty="0"/>
@@ -5087,7 +5141,7 @@
           <p:cNvPr id="2" name="Titre 1">
             <a:extLst>
               <a:ext uri="{FF2B5EF4-FFF2-40B4-BE49-F238E27FC236}">
-                <a16:creationId xmlns:a16="http://schemas.microsoft.com/office/drawing/2014/main" id="{D520A5FA-EECE-4BD4-96ED-3087B8E585DA}"/>
+                <a16:creationId xmlns="" xmlns:a16="http://schemas.microsoft.com/office/drawing/2014/main" id="{D520A5FA-EECE-4BD4-96ED-3087B8E585DA}"/>
               </a:ext>
             </a:extLst>
           </p:cNvPr>
@@ -5098,12 +5152,21 @@
             <p:ph type="ctrTitle"/>
           </p:nvPr>
         </p:nvSpPr>
-        <p:spPr/>
+        <p:spPr>
+          <a:xfrm>
+            <a:off x="683568" y="1814959"/>
+            <a:ext cx="7772400" cy="1686049"/>
+          </a:xfrm>
+        </p:spPr>
         <p:txBody>
           <a:bodyPr/>
           <a:lstStyle/>
           <a:p>
-            <a:endParaRPr lang="fr-FR"/>
+            <a:r>
+              <a:rPr lang="fr-FR" dirty="0" smtClean="0"/>
+              <a:t>Images aériennes</a:t>
+            </a:r>
+            <a:endParaRPr lang="fr-FR" dirty="0"/>
           </a:p>
         </p:txBody>
       </p:sp>
@@ -5112,7 +5175,7 @@
           <p:cNvPr id="3" name="Sous-titre 2">
             <a:extLst>
               <a:ext uri="{FF2B5EF4-FFF2-40B4-BE49-F238E27FC236}">
-                <a16:creationId xmlns:a16="http://schemas.microsoft.com/office/drawing/2014/main" id="{AE5CE3A8-BEF8-49CE-8259-AF54ABE6F5E6}"/>
+                <a16:creationId xmlns="" xmlns:a16="http://schemas.microsoft.com/office/drawing/2014/main" id="{AE5CE3A8-BEF8-49CE-8259-AF54ABE6F5E6}"/>
               </a:ext>
             </a:extLst>
           </p:cNvPr>
@@ -5128,7 +5191,17 @@
           <a:bodyPr/>
           <a:lstStyle/>
           <a:p>
-            <a:endParaRPr lang="fr-FR"/>
+            <a:r>
+              <a:rPr lang="fr-FR" dirty="0" smtClean="0"/>
+              <a:t>Présentation</a:t>
+            </a:r>
+          </a:p>
+          <a:p>
+            <a:r>
+              <a:rPr lang="fr-FR" sz="2400" dirty="0" smtClean="0"/>
+              <a:t>08/01/2019</a:t>
+            </a:r>
+            <a:endParaRPr lang="fr-FR" sz="2400" dirty="0"/>
           </a:p>
         </p:txBody>
       </p:sp>
@@ -5137,7 +5210,7 @@
           <p:cNvPr id="4" name="Espace réservé du numéro de diapositive 3">
             <a:extLst>
               <a:ext uri="{FF2B5EF4-FFF2-40B4-BE49-F238E27FC236}">
-                <a16:creationId xmlns:a16="http://schemas.microsoft.com/office/drawing/2014/main" id="{BCD0EE2E-7F79-4B97-8CDD-6C1352975D6B}"/>
+                <a16:creationId xmlns="" xmlns:a16="http://schemas.microsoft.com/office/drawing/2014/main" id="{BCD0EE2E-7F79-4B97-8CDD-6C1352975D6B}"/>
               </a:ext>
             </a:extLst>
           </p:cNvPr>
@@ -5171,7 +5244,7 @@
           <p:cNvPr id="5" name="Espace réservé de la date 4">
             <a:extLst>
               <a:ext uri="{FF2B5EF4-FFF2-40B4-BE49-F238E27FC236}">
-                <a16:creationId xmlns:a16="http://schemas.microsoft.com/office/drawing/2014/main" id="{5F2D49A8-EFA6-4E59-99D1-230FFCCA96D9}"/>
+                <a16:creationId xmlns="" xmlns:a16="http://schemas.microsoft.com/office/drawing/2014/main" id="{5F2D49A8-EFA6-4E59-99D1-230FFCCA96D9}"/>
               </a:ext>
             </a:extLst>
           </p:cNvPr>
@@ -5210,7 +5283,7 @@
           <p:cNvPr id="6" name="Espace réservé du pied de page 5">
             <a:extLst>
               <a:ext uri="{FF2B5EF4-FFF2-40B4-BE49-F238E27FC236}">
-                <a16:creationId xmlns:a16="http://schemas.microsoft.com/office/drawing/2014/main" id="{61AB7B8D-A5D5-40DA-88AE-D8699A4B600E}"/>
+                <a16:creationId xmlns="" xmlns:a16="http://schemas.microsoft.com/office/drawing/2014/main" id="{61AB7B8D-A5D5-40DA-88AE-D8699A4B600E}"/>
               </a:ext>
             </a:extLst>
           </p:cNvPr>
@@ -5244,9 +5317,174 @@
     </p:spTree>
     <p:extLst>
       <p:ext uri="{BB962C8B-B14F-4D97-AF65-F5344CB8AC3E}">
-        <p14:creationId xmlns:p14="http://schemas.microsoft.com/office/powerpoint/2010/main" val="2578753244"/>
+        <p14:creationId xmlns="" xmlns:p14="http://schemas.microsoft.com/office/powerpoint/2010/main" val="2578753244"/>
       </p:ext>
     </p:extLst>
+  </p:cSld>
+  <p:clrMapOvr>
+    <a:masterClrMapping/>
+  </p:clrMapOvr>
+  <p:timing>
+    <p:tnLst>
+      <p:par>
+        <p:cTn id="1" dur="indefinite" restart="never" nodeType="tmRoot"/>
+      </p:par>
+    </p:tnLst>
+  </p:timing>
+</p:sld>
+</file>
+
+<file path=ppt/slides/slide10.xml><?xml version="1.0" encoding="utf-8"?>
+<p:sld xmlns:a="http://schemas.openxmlformats.org/drawingml/2006/main" xmlns:r="http://schemas.openxmlformats.org/officeDocument/2006/relationships" xmlns:p="http://schemas.openxmlformats.org/presentationml/2006/main">
+  <p:cSld>
+    <p:spTree>
+      <p:nvGrpSpPr>
+        <p:cNvPr id="1" name=""/>
+        <p:cNvGrpSpPr/>
+        <p:nvPr/>
+      </p:nvGrpSpPr>
+      <p:grpSpPr>
+        <a:xfrm>
+          <a:off x="0" y="0"/>
+          <a:ext cx="0" cy="0"/>
+          <a:chOff x="0" y="0"/>
+          <a:chExt cx="0" cy="0"/>
+        </a:xfrm>
+      </p:grpSpPr>
+      <p:sp>
+        <p:nvSpPr>
+          <p:cNvPr id="2" name="Titre 1"/>
+          <p:cNvSpPr>
+            <a:spLocks noGrp="1"/>
+          </p:cNvSpPr>
+          <p:nvPr>
+            <p:ph type="title"/>
+          </p:nvPr>
+        </p:nvSpPr>
+        <p:spPr/>
+        <p:txBody>
+          <a:bodyPr/>
+          <a:lstStyle/>
+          <a:p>
+            <a:r>
+              <a:rPr lang="fr-FR" dirty="0" smtClean="0"/>
+              <a:t>Conclusion</a:t>
+            </a:r>
+            <a:endParaRPr lang="fr-FR" dirty="0"/>
+          </a:p>
+        </p:txBody>
+      </p:sp>
+      <p:sp>
+        <p:nvSpPr>
+          <p:cNvPr id="3" name="Espace réservé du contenu 2"/>
+          <p:cNvSpPr>
+            <a:spLocks noGrp="1"/>
+          </p:cNvSpPr>
+          <p:nvPr>
+            <p:ph idx="1"/>
+          </p:nvPr>
+        </p:nvSpPr>
+        <p:spPr/>
+        <p:txBody>
+          <a:bodyPr/>
+          <a:lstStyle/>
+          <a:p>
+            <a:endParaRPr lang="fr-FR"/>
+          </a:p>
+        </p:txBody>
+      </p:sp>
+      <p:sp>
+        <p:nvSpPr>
+          <p:cNvPr id="4" name="Espace réservé du numéro de diapositive 3"/>
+          <p:cNvSpPr>
+            <a:spLocks noGrp="1"/>
+          </p:cNvSpPr>
+          <p:nvPr>
+            <p:ph type="sldNum" sz="quarter" idx="4"/>
+          </p:nvPr>
+        </p:nvSpPr>
+        <p:spPr/>
+        <p:txBody>
+          <a:bodyPr/>
+          <a:lstStyle/>
+          <a:p>
+            <a:r>
+              <a:rPr lang="fr-FR" smtClean="0"/>
+              <a:t>	</a:t>
+            </a:r>
+            <a:fld id="{09390BE9-E4CD-414E-A8A9-9535CDDB3176}" type="slidenum">
+              <a:rPr lang="fr-FR" sz="2000" smtClean="0"/>
+              <a:pPr/>
+              <a:t>10</a:t>
+            </a:fld>
+            <a:endParaRPr lang="fr-FR" sz="2000" dirty="0"/>
+          </a:p>
+        </p:txBody>
+      </p:sp>
+      <p:sp>
+        <p:nvSpPr>
+          <p:cNvPr id="5" name="Espace réservé de la date 4"/>
+          <p:cNvSpPr>
+            <a:spLocks noGrp="1"/>
+          </p:cNvSpPr>
+          <p:nvPr>
+            <p:ph type="dt" sz="half" idx="2"/>
+          </p:nvPr>
+        </p:nvSpPr>
+        <p:spPr/>
+        <p:txBody>
+          <a:bodyPr/>
+          <a:lstStyle/>
+          <a:p>
+            <a:r>
+              <a:rPr lang="fr-FR" smtClean="0"/>
+              <a:t>IN52</a:t>
+            </a:r>
+            <a:br>
+              <a:rPr lang="fr-FR" smtClean="0"/>
+            </a:br>
+            <a:r>
+              <a:rPr lang="fr-FR" smtClean="0"/>
+              <a:t>IN54</a:t>
+            </a:r>
+            <a:br>
+              <a:rPr lang="fr-FR" smtClean="0"/>
+            </a:br>
+            <a:endParaRPr lang="fr-FR" dirty="0"/>
+          </a:p>
+        </p:txBody>
+      </p:sp>
+      <p:sp>
+        <p:nvSpPr>
+          <p:cNvPr id="6" name="Espace réservé du pied de page 5"/>
+          <p:cNvSpPr>
+            <a:spLocks noGrp="1"/>
+          </p:cNvSpPr>
+          <p:nvPr>
+            <p:ph type="ftr" sz="quarter" idx="3"/>
+          </p:nvPr>
+        </p:nvSpPr>
+        <p:spPr/>
+        <p:txBody>
+          <a:bodyPr/>
+          <a:lstStyle/>
+          <a:p>
+            <a:r>
+              <a:rPr lang="fr-FR" smtClean="0"/>
+              <a:t>Mathilde Perrot – Romain Begagnon – Emilien Moncan</a:t>
+            </a:r>
+            <a:br>
+              <a:rPr lang="fr-FR" smtClean="0"/>
+            </a:br>
+            <a:r>
+              <a:rPr lang="fr-FR" smtClean="0"/>
+              <a:t>Remi Ponnelle – Nahil Zamiati</a:t>
+            </a:r>
+            <a:endParaRPr lang="fr-FR" dirty="0"/>
+          </a:p>
+        </p:txBody>
+      </p:sp>
+    </p:spTree>
   </p:cSld>
   <p:clrMapOvr>
     <a:masterClrMapping/>
@@ -5276,7 +5514,7 @@
           <p:cNvPr id="2" name="Titre 1">
             <a:extLst>
               <a:ext uri="{FF2B5EF4-FFF2-40B4-BE49-F238E27FC236}">
-                <a16:creationId xmlns:a16="http://schemas.microsoft.com/office/drawing/2014/main" id="{431CA905-D658-4DE6-9B61-5B0DC5083DC3}"/>
+                <a16:creationId xmlns="" xmlns:a16="http://schemas.microsoft.com/office/drawing/2014/main" id="{431CA905-D658-4DE6-9B61-5B0DC5083DC3}"/>
               </a:ext>
             </a:extLst>
           </p:cNvPr>
@@ -5292,7 +5530,11 @@
           <a:bodyPr/>
           <a:lstStyle/>
           <a:p>
-            <a:endParaRPr lang="fr-FR"/>
+            <a:r>
+              <a:rPr lang="fr-FR" dirty="0" smtClean="0"/>
+              <a:t>Sommaire</a:t>
+            </a:r>
+            <a:endParaRPr lang="fr-FR" dirty="0"/>
           </a:p>
         </p:txBody>
       </p:sp>
@@ -5301,7 +5543,7 @@
           <p:cNvPr id="3" name="Espace réservé du contenu 2">
             <a:extLst>
               <a:ext uri="{FF2B5EF4-FFF2-40B4-BE49-F238E27FC236}">
-                <a16:creationId xmlns:a16="http://schemas.microsoft.com/office/drawing/2014/main" id="{2E8F072A-8FFF-4CB3-AC66-0A121116B03D}"/>
+                <a16:creationId xmlns="" xmlns:a16="http://schemas.microsoft.com/office/drawing/2014/main" id="{2E8F072A-8FFF-4CB3-AC66-0A121116B03D}"/>
               </a:ext>
             </a:extLst>
           </p:cNvPr>
@@ -5317,7 +5559,65 @@
           <a:bodyPr/>
           <a:lstStyle/>
           <a:p>
-            <a:endParaRPr lang="fr-FR"/>
+            <a:pPr>
+              <a:spcAft>
+                <a:spcPts val="600"/>
+              </a:spcAft>
+              <a:buNone/>
+            </a:pPr>
+            <a:r>
+              <a:rPr lang="fr-FR" dirty="0" smtClean="0"/>
+              <a:t>Introduction</a:t>
+            </a:r>
+          </a:p>
+          <a:p>
+            <a:pPr>
+              <a:spcAft>
+                <a:spcPts val="600"/>
+              </a:spcAft>
+              <a:buNone/>
+            </a:pPr>
+            <a:r>
+              <a:rPr lang="fr-FR" dirty="0" smtClean="0"/>
+              <a:t>I. Méthodes étudiées</a:t>
+            </a:r>
+          </a:p>
+          <a:p>
+            <a:pPr>
+              <a:spcAft>
+                <a:spcPts val="600"/>
+              </a:spcAft>
+              <a:buNone/>
+            </a:pPr>
+            <a:r>
+              <a:rPr lang="fr-FR" dirty="0" smtClean="0"/>
+              <a:t>II. Méthode implémentée</a:t>
+            </a:r>
+          </a:p>
+          <a:p>
+            <a:pPr>
+              <a:spcAft>
+                <a:spcPts val="600"/>
+              </a:spcAft>
+              <a:buNone/>
+            </a:pPr>
+            <a:r>
+              <a:rPr lang="fr-FR" dirty="0" smtClean="0"/>
+              <a:t>III. Résultats</a:t>
+            </a:r>
+          </a:p>
+          <a:p>
+            <a:pPr>
+              <a:spcAft>
+                <a:spcPts val="600"/>
+              </a:spcAft>
+              <a:buNone/>
+            </a:pPr>
+            <a:r>
+              <a:rPr lang="fr-FR" dirty="0" smtClean="0"/>
+              <a:t>Conclusion</a:t>
+            </a:r>
+            <a:endParaRPr lang="fr-FR" dirty="0"/>
           </a:p>
         </p:txBody>
       </p:sp>
@@ -5326,7 +5626,7 @@
           <p:cNvPr id="4" name="Espace réservé du numéro de diapositive 3">
             <a:extLst>
               <a:ext uri="{FF2B5EF4-FFF2-40B4-BE49-F238E27FC236}">
-                <a16:creationId xmlns:a16="http://schemas.microsoft.com/office/drawing/2014/main" id="{548BDFC5-6BC7-471F-83CF-D0E185D5CA6E}"/>
+                <a16:creationId xmlns="" xmlns:a16="http://schemas.microsoft.com/office/drawing/2014/main" id="{548BDFC5-6BC7-471F-83CF-D0E185D5CA6E}"/>
               </a:ext>
             </a:extLst>
           </p:cNvPr>
@@ -5360,7 +5660,7 @@
           <p:cNvPr id="5" name="Espace réservé de la date 4">
             <a:extLst>
               <a:ext uri="{FF2B5EF4-FFF2-40B4-BE49-F238E27FC236}">
-                <a16:creationId xmlns:a16="http://schemas.microsoft.com/office/drawing/2014/main" id="{7DF21FB1-2057-406C-B73E-759C76CCE0D8}"/>
+                <a16:creationId xmlns="" xmlns:a16="http://schemas.microsoft.com/office/drawing/2014/main" id="{7DF21FB1-2057-406C-B73E-759C76CCE0D8}"/>
               </a:ext>
             </a:extLst>
           </p:cNvPr>
@@ -5377,29 +5677,1206 @@
           <a:lstStyle/>
           <a:p>
             <a:r>
+              <a:rPr lang="fr-FR" dirty="0"/>
+              <a:t>IN52</a:t>
+            </a:r>
+            <a:br>
+              <a:rPr lang="fr-FR" dirty="0"/>
+            </a:br>
+            <a:r>
+              <a:rPr lang="fr-FR" dirty="0"/>
+              <a:t>IN54</a:t>
+            </a:r>
+            <a:br>
+              <a:rPr lang="fr-FR" dirty="0"/>
+            </a:br>
+            <a:endParaRPr lang="fr-FR" dirty="0"/>
+          </a:p>
+        </p:txBody>
+      </p:sp>
+      <p:sp>
+        <p:nvSpPr>
+          <p:cNvPr id="6" name="Espace réservé du pied de page 5">
+            <a:extLst>
+              <a:ext uri="{FF2B5EF4-FFF2-40B4-BE49-F238E27FC236}">
+                <a16:creationId xmlns="" xmlns:a16="http://schemas.microsoft.com/office/drawing/2014/main" id="{78DA7573-D10D-4AEB-96D9-FF4F5408A076}"/>
+              </a:ext>
+            </a:extLst>
+          </p:cNvPr>
+          <p:cNvSpPr>
+            <a:spLocks noGrp="1"/>
+          </p:cNvSpPr>
+          <p:nvPr>
+            <p:ph type="ftr" sz="quarter" idx="3"/>
+          </p:nvPr>
+        </p:nvSpPr>
+        <p:spPr/>
+        <p:txBody>
+          <a:bodyPr/>
+          <a:lstStyle/>
+          <a:p>
+            <a:r>
               <a:rPr lang="fr-FR"/>
-              <a:t>IN52</a:t>
+              <a:t>Mathilde Perrot – Romain Begagnon – Emilien Moncan</a:t>
             </a:r>
             <a:br>
               <a:rPr lang="fr-FR"/>
             </a:br>
             <a:r>
               <a:rPr lang="fr-FR"/>
+              <a:t>Remi Ponnelle – Nahil Zamiati</a:t>
+            </a:r>
+            <a:endParaRPr lang="fr-FR" dirty="0"/>
+          </a:p>
+        </p:txBody>
+      </p:sp>
+    </p:spTree>
+    <p:extLst>
+      <p:ext uri="{BB962C8B-B14F-4D97-AF65-F5344CB8AC3E}">
+        <p14:creationId xmlns="" xmlns:p14="http://schemas.microsoft.com/office/powerpoint/2010/main" val="1413229723"/>
+      </p:ext>
+    </p:extLst>
+  </p:cSld>
+  <p:clrMapOvr>
+    <a:masterClrMapping/>
+  </p:clrMapOvr>
+  <p:timing>
+    <p:tnLst>
+      <p:par>
+        <p:cTn id="1" dur="indefinite" restart="never" nodeType="tmRoot"/>
+      </p:par>
+    </p:tnLst>
+  </p:timing>
+</p:sld>
+</file>
+
+<file path=ppt/slides/slide3.xml><?xml version="1.0" encoding="utf-8"?>
+<p:sld xmlns:a="http://schemas.openxmlformats.org/drawingml/2006/main" xmlns:r="http://schemas.openxmlformats.org/officeDocument/2006/relationships" xmlns:p="http://schemas.openxmlformats.org/presentationml/2006/main">
+  <p:cSld>
+    <p:spTree>
+      <p:nvGrpSpPr>
+        <p:cNvPr id="1" name=""/>
+        <p:cNvGrpSpPr/>
+        <p:nvPr/>
+      </p:nvGrpSpPr>
+      <p:grpSpPr>
+        <a:xfrm>
+          <a:off x="0" y="0"/>
+          <a:ext cx="0" cy="0"/>
+          <a:chOff x="0" y="0"/>
+          <a:chExt cx="0" cy="0"/>
+        </a:xfrm>
+      </p:grpSpPr>
+      <p:sp>
+        <p:nvSpPr>
+          <p:cNvPr id="2" name="Titre 1"/>
+          <p:cNvSpPr>
+            <a:spLocks noGrp="1"/>
+          </p:cNvSpPr>
+          <p:nvPr>
+            <p:ph type="title"/>
+          </p:nvPr>
+        </p:nvSpPr>
+        <p:spPr/>
+        <p:txBody>
+          <a:bodyPr/>
+          <a:lstStyle/>
+          <a:p>
+            <a:r>
+              <a:rPr lang="fr-FR" dirty="0" smtClean="0"/>
+              <a:t>Introduction</a:t>
+            </a:r>
+            <a:endParaRPr lang="fr-FR" dirty="0"/>
+          </a:p>
+        </p:txBody>
+      </p:sp>
+      <p:sp>
+        <p:nvSpPr>
+          <p:cNvPr id="3" name="Espace réservé du contenu 2"/>
+          <p:cNvSpPr>
+            <a:spLocks noGrp="1"/>
+          </p:cNvSpPr>
+          <p:nvPr>
+            <p:ph idx="1"/>
+          </p:nvPr>
+        </p:nvSpPr>
+        <p:spPr/>
+        <p:txBody>
+          <a:bodyPr/>
+          <a:lstStyle/>
+          <a:p>
+            <a:endParaRPr lang="fr-FR"/>
+          </a:p>
+        </p:txBody>
+      </p:sp>
+      <p:sp>
+        <p:nvSpPr>
+          <p:cNvPr id="4" name="Espace réservé du numéro de diapositive 3"/>
+          <p:cNvSpPr>
+            <a:spLocks noGrp="1"/>
+          </p:cNvSpPr>
+          <p:nvPr>
+            <p:ph type="sldNum" sz="quarter" idx="4"/>
+          </p:nvPr>
+        </p:nvSpPr>
+        <p:spPr/>
+        <p:txBody>
+          <a:bodyPr/>
+          <a:lstStyle/>
+          <a:p>
+            <a:r>
+              <a:rPr lang="fr-FR" smtClean="0"/>
+              <a:t>	</a:t>
+            </a:r>
+            <a:fld id="{09390BE9-E4CD-414E-A8A9-9535CDDB3176}" type="slidenum">
+              <a:rPr lang="fr-FR" sz="2000" smtClean="0"/>
+              <a:pPr/>
+              <a:t>3</a:t>
+            </a:fld>
+            <a:endParaRPr lang="fr-FR" sz="2000" dirty="0"/>
+          </a:p>
+        </p:txBody>
+      </p:sp>
+      <p:sp>
+        <p:nvSpPr>
+          <p:cNvPr id="5" name="Espace réservé de la date 4"/>
+          <p:cNvSpPr>
+            <a:spLocks noGrp="1"/>
+          </p:cNvSpPr>
+          <p:nvPr>
+            <p:ph type="dt" sz="half" idx="2"/>
+          </p:nvPr>
+        </p:nvSpPr>
+        <p:spPr/>
+        <p:txBody>
+          <a:bodyPr/>
+          <a:lstStyle/>
+          <a:p>
+            <a:r>
+              <a:rPr lang="fr-FR" smtClean="0"/>
+              <a:t>IN52</a:t>
+            </a:r>
+            <a:br>
+              <a:rPr lang="fr-FR" smtClean="0"/>
+            </a:br>
+            <a:r>
+              <a:rPr lang="fr-FR" smtClean="0"/>
               <a:t>IN54</a:t>
+            </a:r>
+            <a:br>
+              <a:rPr lang="fr-FR" smtClean="0"/>
+            </a:br>
+            <a:endParaRPr lang="fr-FR" dirty="0"/>
+          </a:p>
+        </p:txBody>
+      </p:sp>
+      <p:sp>
+        <p:nvSpPr>
+          <p:cNvPr id="6" name="Espace réservé du pied de page 5"/>
+          <p:cNvSpPr>
+            <a:spLocks noGrp="1"/>
+          </p:cNvSpPr>
+          <p:nvPr>
+            <p:ph type="ftr" sz="quarter" idx="3"/>
+          </p:nvPr>
+        </p:nvSpPr>
+        <p:spPr/>
+        <p:txBody>
+          <a:bodyPr/>
+          <a:lstStyle/>
+          <a:p>
+            <a:r>
+              <a:rPr lang="fr-FR" smtClean="0"/>
+              <a:t>Mathilde Perrot – Romain Begagnon – Emilien Moncan</a:t>
+            </a:r>
+            <a:br>
+              <a:rPr lang="fr-FR" smtClean="0"/>
+            </a:br>
+            <a:r>
+              <a:rPr lang="fr-FR" smtClean="0"/>
+              <a:t>Remi Ponnelle – Nahil Zamiati</a:t>
+            </a:r>
+            <a:endParaRPr lang="fr-FR" dirty="0"/>
+          </a:p>
+        </p:txBody>
+      </p:sp>
+    </p:spTree>
+  </p:cSld>
+  <p:clrMapOvr>
+    <a:masterClrMapping/>
+  </p:clrMapOvr>
+</p:sld>
+</file>
+
+<file path=ppt/slides/slide4.xml><?xml version="1.0" encoding="utf-8"?>
+<p:sld xmlns:a="http://schemas.openxmlformats.org/drawingml/2006/main" xmlns:r="http://schemas.openxmlformats.org/officeDocument/2006/relationships" xmlns:p="http://schemas.openxmlformats.org/presentationml/2006/main">
+  <p:cSld>
+    <p:spTree>
+      <p:nvGrpSpPr>
+        <p:cNvPr id="1" name=""/>
+        <p:cNvGrpSpPr/>
+        <p:nvPr/>
+      </p:nvGrpSpPr>
+      <p:grpSpPr>
+        <a:xfrm>
+          <a:off x="0" y="0"/>
+          <a:ext cx="0" cy="0"/>
+          <a:chOff x="0" y="0"/>
+          <a:chExt cx="0" cy="0"/>
+        </a:xfrm>
+      </p:grpSpPr>
+      <p:sp>
+        <p:nvSpPr>
+          <p:cNvPr id="2" name="Titre 1"/>
+          <p:cNvSpPr>
+            <a:spLocks noGrp="1"/>
+          </p:cNvSpPr>
+          <p:nvPr>
+            <p:ph type="title"/>
+          </p:nvPr>
+        </p:nvSpPr>
+        <p:spPr/>
+        <p:txBody>
+          <a:bodyPr/>
+          <a:lstStyle/>
+          <a:p>
+            <a:r>
+              <a:rPr lang="fr-FR" dirty="0" smtClean="0"/>
+              <a:t>I. Méthodes étudiées</a:t>
+            </a:r>
+            <a:endParaRPr lang="fr-FR" dirty="0"/>
+          </a:p>
+        </p:txBody>
+      </p:sp>
+      <p:sp>
+        <p:nvSpPr>
+          <p:cNvPr id="3" name="Espace réservé du contenu 2"/>
+          <p:cNvSpPr>
+            <a:spLocks noGrp="1"/>
+          </p:cNvSpPr>
+          <p:nvPr>
+            <p:ph idx="1"/>
+          </p:nvPr>
+        </p:nvSpPr>
+        <p:spPr/>
+        <p:txBody>
+          <a:bodyPr/>
+          <a:lstStyle/>
+          <a:p>
+            <a:endParaRPr lang="fr-FR"/>
+          </a:p>
+        </p:txBody>
+      </p:sp>
+      <p:sp>
+        <p:nvSpPr>
+          <p:cNvPr id="4" name="Espace réservé du numéro de diapositive 3"/>
+          <p:cNvSpPr>
+            <a:spLocks noGrp="1"/>
+          </p:cNvSpPr>
+          <p:nvPr>
+            <p:ph type="sldNum" sz="quarter" idx="4"/>
+          </p:nvPr>
+        </p:nvSpPr>
+        <p:spPr/>
+        <p:txBody>
+          <a:bodyPr/>
+          <a:lstStyle/>
+          <a:p>
+            <a:r>
+              <a:rPr lang="fr-FR" smtClean="0"/>
+              <a:t>	</a:t>
+            </a:r>
+            <a:fld id="{09390BE9-E4CD-414E-A8A9-9535CDDB3176}" type="slidenum">
+              <a:rPr lang="fr-FR" sz="2000" smtClean="0"/>
+              <a:pPr/>
+              <a:t>4</a:t>
+            </a:fld>
+            <a:endParaRPr lang="fr-FR" sz="2000" dirty="0"/>
+          </a:p>
+        </p:txBody>
+      </p:sp>
+      <p:sp>
+        <p:nvSpPr>
+          <p:cNvPr id="5" name="Espace réservé de la date 4"/>
+          <p:cNvSpPr>
+            <a:spLocks noGrp="1"/>
+          </p:cNvSpPr>
+          <p:nvPr>
+            <p:ph type="dt" sz="half" idx="2"/>
+          </p:nvPr>
+        </p:nvSpPr>
+        <p:spPr/>
+        <p:txBody>
+          <a:bodyPr/>
+          <a:lstStyle/>
+          <a:p>
+            <a:r>
+              <a:rPr lang="fr-FR" smtClean="0"/>
+              <a:t>IN52</a:t>
+            </a:r>
+            <a:br>
+              <a:rPr lang="fr-FR" smtClean="0"/>
+            </a:br>
+            <a:r>
+              <a:rPr lang="fr-FR" smtClean="0"/>
+              <a:t>IN54</a:t>
+            </a:r>
+            <a:br>
+              <a:rPr lang="fr-FR" smtClean="0"/>
+            </a:br>
+            <a:endParaRPr lang="fr-FR" dirty="0"/>
+          </a:p>
+        </p:txBody>
+      </p:sp>
+      <p:sp>
+        <p:nvSpPr>
+          <p:cNvPr id="6" name="Espace réservé du pied de page 5"/>
+          <p:cNvSpPr>
+            <a:spLocks noGrp="1"/>
+          </p:cNvSpPr>
+          <p:nvPr>
+            <p:ph type="ftr" sz="quarter" idx="3"/>
+          </p:nvPr>
+        </p:nvSpPr>
+        <p:spPr/>
+        <p:txBody>
+          <a:bodyPr/>
+          <a:lstStyle/>
+          <a:p>
+            <a:r>
+              <a:rPr lang="fr-FR" smtClean="0"/>
+              <a:t>Mathilde Perrot – Romain Begagnon – Emilien Moncan</a:t>
+            </a:r>
+            <a:br>
+              <a:rPr lang="fr-FR" smtClean="0"/>
+            </a:br>
+            <a:r>
+              <a:rPr lang="fr-FR" smtClean="0"/>
+              <a:t>Remi Ponnelle – Nahil Zamiati</a:t>
+            </a:r>
+            <a:endParaRPr lang="fr-FR" dirty="0"/>
+          </a:p>
+        </p:txBody>
+      </p:sp>
+    </p:spTree>
+  </p:cSld>
+  <p:clrMapOvr>
+    <a:masterClrMapping/>
+  </p:clrMapOvr>
+</p:sld>
+</file>
+
+<file path=ppt/slides/slide5.xml><?xml version="1.0" encoding="utf-8"?>
+<p:sld xmlns:a="http://schemas.openxmlformats.org/drawingml/2006/main" xmlns:r="http://schemas.openxmlformats.org/officeDocument/2006/relationships" xmlns:p="http://schemas.openxmlformats.org/presentationml/2006/main">
+  <p:cSld>
+    <p:spTree>
+      <p:nvGrpSpPr>
+        <p:cNvPr id="1" name=""/>
+        <p:cNvGrpSpPr/>
+        <p:nvPr/>
+      </p:nvGrpSpPr>
+      <p:grpSpPr>
+        <a:xfrm>
+          <a:off x="0" y="0"/>
+          <a:ext cx="0" cy="0"/>
+          <a:chOff x="0" y="0"/>
+          <a:chExt cx="0" cy="0"/>
+        </a:xfrm>
+      </p:grpSpPr>
+      <p:sp>
+        <p:nvSpPr>
+          <p:cNvPr id="2" name="Titre 1"/>
+          <p:cNvSpPr>
+            <a:spLocks noGrp="1"/>
+          </p:cNvSpPr>
+          <p:nvPr>
+            <p:ph type="title"/>
+          </p:nvPr>
+        </p:nvSpPr>
+        <p:spPr/>
+        <p:txBody>
+          <a:bodyPr/>
+          <a:lstStyle/>
+          <a:p>
+            <a:r>
+              <a:rPr lang="fr-FR" dirty="0" smtClean="0"/>
+              <a:t>II. Méthode </a:t>
+            </a:r>
+            <a:r>
+              <a:rPr lang="fr-FR" dirty="0" smtClean="0"/>
+              <a:t>implémentée</a:t>
+            </a:r>
+            <a:endParaRPr lang="fr-FR" dirty="0"/>
+          </a:p>
+        </p:txBody>
+      </p:sp>
+      <p:sp>
+        <p:nvSpPr>
+          <p:cNvPr id="3" name="Espace réservé du contenu 2"/>
+          <p:cNvSpPr>
+            <a:spLocks noGrp="1"/>
+          </p:cNvSpPr>
+          <p:nvPr>
+            <p:ph idx="1"/>
+          </p:nvPr>
+        </p:nvSpPr>
+        <p:spPr/>
+        <p:txBody>
+          <a:bodyPr/>
+          <a:lstStyle/>
+          <a:p>
+            <a:pPr>
+              <a:spcAft>
+                <a:spcPts val="600"/>
+              </a:spcAft>
+              <a:buNone/>
+            </a:pPr>
+            <a:r>
+              <a:rPr lang="fr-FR" dirty="0" smtClean="0"/>
+              <a:t>Développement sous </a:t>
+            </a:r>
+            <a:r>
+              <a:rPr lang="fr-FR" dirty="0" err="1" smtClean="0"/>
+              <a:t>Matlab</a:t>
+            </a:r>
+            <a:endParaRPr lang="fr-FR" dirty="0" smtClean="0"/>
+          </a:p>
+          <a:p>
+            <a:pPr lvl="1">
+              <a:spcAft>
+                <a:spcPts val="600"/>
+              </a:spcAft>
+              <a:buFont typeface="Arial" pitchFamily="34" charset="0"/>
+              <a:buChar char="•"/>
+            </a:pPr>
+            <a:r>
+              <a:rPr lang="fr-FR" dirty="0" smtClean="0"/>
+              <a:t>Facilité d’utilisation</a:t>
+            </a:r>
+          </a:p>
+          <a:p>
+            <a:pPr lvl="1">
+              <a:buFont typeface="Arial" pitchFamily="34" charset="0"/>
+              <a:buChar char="•"/>
+            </a:pPr>
+            <a:r>
+              <a:rPr lang="fr-FR" dirty="0" err="1" smtClean="0"/>
+              <a:t>Toolbox</a:t>
+            </a:r>
+            <a:r>
+              <a:rPr lang="fr-FR" dirty="0" smtClean="0"/>
+              <a:t> pour le traitement d’images</a:t>
+            </a:r>
+          </a:p>
+          <a:p>
+            <a:pPr>
+              <a:buNone/>
+            </a:pPr>
+            <a:endParaRPr lang="fr-FR" dirty="0" smtClean="0"/>
+          </a:p>
+          <a:p>
+            <a:pPr>
+              <a:spcAft>
+                <a:spcPts val="600"/>
+              </a:spcAft>
+              <a:buNone/>
+            </a:pPr>
+            <a:r>
+              <a:rPr lang="fr-FR" dirty="0" smtClean="0"/>
+              <a:t>Principe de la méthode</a:t>
+            </a:r>
+          </a:p>
+          <a:p>
+            <a:pPr lvl="1">
+              <a:spcAft>
+                <a:spcPts val="600"/>
+              </a:spcAft>
+              <a:buFont typeface="Arial" pitchFamily="34" charset="0"/>
+              <a:buChar char="•"/>
+            </a:pPr>
+            <a:r>
+              <a:rPr lang="fr-FR" dirty="0" smtClean="0"/>
+              <a:t>Analyse des couleurs de l’image</a:t>
+            </a:r>
+          </a:p>
+          <a:p>
+            <a:pPr lvl="1">
+              <a:buFont typeface="Arial" pitchFamily="34" charset="0"/>
+              <a:buChar char="•"/>
+            </a:pPr>
+            <a:r>
+              <a:rPr lang="fr-FR" dirty="0" smtClean="0"/>
+              <a:t>Extraction des régions dont la couleur correspond à celle d’une piscine</a:t>
+            </a:r>
+          </a:p>
+        </p:txBody>
+      </p:sp>
+      <p:sp>
+        <p:nvSpPr>
+          <p:cNvPr id="5" name="Espace réservé du numéro de diapositive 3">
+            <a:extLst>
+              <a:ext uri="{FF2B5EF4-FFF2-40B4-BE49-F238E27FC236}">
+                <a16:creationId xmlns="" xmlns:a16="http://schemas.microsoft.com/office/drawing/2014/main" id="{548BDFC5-6BC7-471F-83CF-D0E185D5CA6E}"/>
+              </a:ext>
+            </a:extLst>
+          </p:cNvPr>
+          <p:cNvSpPr>
+            <a:spLocks noGrp="1"/>
+          </p:cNvSpPr>
+          <p:nvPr>
+            <p:ph type="sldNum" sz="quarter" idx="4"/>
+          </p:nvPr>
+        </p:nvSpPr>
+        <p:spPr>
+          <a:xfrm>
+            <a:off x="6892822" y="6453336"/>
+            <a:ext cx="2133600" cy="365125"/>
+          </a:xfrm>
+        </p:spPr>
+        <p:txBody>
+          <a:bodyPr/>
+          <a:lstStyle/>
+          <a:p>
+            <a:r>
+              <a:rPr lang="fr-FR"/>
+              <a:t>	</a:t>
+            </a:r>
+            <a:fld id="{09390BE9-E4CD-414E-A8A9-9535CDDB3176}" type="slidenum">
+              <a:rPr lang="fr-FR" sz="2000" smtClean="0"/>
+              <a:pPr/>
+              <a:t>5</a:t>
+            </a:fld>
+            <a:endParaRPr lang="fr-FR" sz="2000" dirty="0"/>
+          </a:p>
+        </p:txBody>
+      </p:sp>
+      <p:sp>
+        <p:nvSpPr>
+          <p:cNvPr id="6" name="Espace réservé de la date 4">
+            <a:extLst>
+              <a:ext uri="{FF2B5EF4-FFF2-40B4-BE49-F238E27FC236}">
+                <a16:creationId xmlns="" xmlns:a16="http://schemas.microsoft.com/office/drawing/2014/main" id="{7DF21FB1-2057-406C-B73E-759C76CCE0D8}"/>
+              </a:ext>
+            </a:extLst>
+          </p:cNvPr>
+          <p:cNvSpPr>
+            <a:spLocks noGrp="1"/>
+          </p:cNvSpPr>
+          <p:nvPr>
+            <p:ph type="dt" sz="half" idx="2"/>
+          </p:nvPr>
+        </p:nvSpPr>
+        <p:spPr>
+          <a:xfrm>
+            <a:off x="107504" y="6547352"/>
+            <a:ext cx="1656184" cy="365125"/>
+          </a:xfrm>
+        </p:spPr>
+        <p:txBody>
+          <a:bodyPr/>
+          <a:lstStyle/>
+          <a:p>
+            <a:r>
+              <a:rPr lang="fr-FR" dirty="0"/>
+              <a:t>IN52</a:t>
+            </a:r>
+            <a:br>
+              <a:rPr lang="fr-FR" dirty="0"/>
+            </a:br>
+            <a:r>
+              <a:rPr lang="fr-FR" dirty="0"/>
+              <a:t>IN54</a:t>
+            </a:r>
+            <a:br>
+              <a:rPr lang="fr-FR" dirty="0"/>
+            </a:br>
+            <a:endParaRPr lang="fr-FR" dirty="0"/>
+          </a:p>
+        </p:txBody>
+      </p:sp>
+      <p:sp>
+        <p:nvSpPr>
+          <p:cNvPr id="7" name="Espace réservé du pied de page 5">
+            <a:extLst>
+              <a:ext uri="{FF2B5EF4-FFF2-40B4-BE49-F238E27FC236}">
+                <a16:creationId xmlns="" xmlns:a16="http://schemas.microsoft.com/office/drawing/2014/main" id="{78DA7573-D10D-4AEB-96D9-FF4F5408A076}"/>
+              </a:ext>
+            </a:extLst>
+          </p:cNvPr>
+          <p:cNvSpPr>
+            <a:spLocks noGrp="1"/>
+          </p:cNvSpPr>
+          <p:nvPr>
+            <p:ph type="ftr" sz="quarter" idx="3"/>
+          </p:nvPr>
+        </p:nvSpPr>
+        <p:spPr>
+          <a:xfrm>
+            <a:off x="1769087" y="6459892"/>
+            <a:ext cx="5328592" cy="365125"/>
+          </a:xfrm>
+        </p:spPr>
+        <p:txBody>
+          <a:bodyPr/>
+          <a:lstStyle/>
+          <a:p>
+            <a:r>
+              <a:rPr lang="fr-FR"/>
+              <a:t>Mathilde Perrot – Romain Begagnon – Emilien Moncan</a:t>
             </a:r>
             <a:br>
               <a:rPr lang="fr-FR"/>
             </a:br>
+            <a:r>
+              <a:rPr lang="fr-FR"/>
+              <a:t>Remi Ponnelle – Nahil Zamiati</a:t>
+            </a:r>
             <a:endParaRPr lang="fr-FR" dirty="0"/>
           </a:p>
         </p:txBody>
       </p:sp>
-      <p:sp>
-        <p:nvSpPr>
-          <p:cNvPr id="6" name="Espace réservé du pied de page 5">
+    </p:spTree>
+  </p:cSld>
+  <p:clrMapOvr>
+    <a:masterClrMapping/>
+  </p:clrMapOvr>
+</p:sld>
+</file>
+
+<file path=ppt/slides/slide6.xml><?xml version="1.0" encoding="utf-8"?>
+<p:sld xmlns:a="http://schemas.openxmlformats.org/drawingml/2006/main" xmlns:r="http://schemas.openxmlformats.org/officeDocument/2006/relationships" xmlns:p="http://schemas.openxmlformats.org/presentationml/2006/main">
+  <p:cSld>
+    <p:spTree>
+      <p:nvGrpSpPr>
+        <p:cNvPr id="1" name=""/>
+        <p:cNvGrpSpPr/>
+        <p:nvPr/>
+      </p:nvGrpSpPr>
+      <p:grpSpPr>
+        <a:xfrm>
+          <a:off x="0" y="0"/>
+          <a:ext cx="0" cy="0"/>
+          <a:chOff x="0" y="0"/>
+          <a:chExt cx="0" cy="0"/>
+        </a:xfrm>
+      </p:grpSpPr>
+      <p:sp>
+        <p:nvSpPr>
+          <p:cNvPr id="2" name="Titre 1"/>
+          <p:cNvSpPr>
+            <a:spLocks noGrp="1"/>
+          </p:cNvSpPr>
+          <p:nvPr>
+            <p:ph type="title"/>
+          </p:nvPr>
+        </p:nvSpPr>
+        <p:spPr/>
+        <p:txBody>
+          <a:bodyPr/>
+          <a:lstStyle/>
+          <a:p>
+            <a:r>
+              <a:rPr lang="fr-FR" dirty="0" smtClean="0"/>
+              <a:t>II. </a:t>
+            </a:r>
+            <a:r>
+              <a:rPr lang="fr-FR" dirty="0" smtClean="0"/>
+              <a:t>Méthode </a:t>
+            </a:r>
+            <a:r>
+              <a:rPr lang="fr-FR" dirty="0" smtClean="0"/>
+              <a:t>implémentée</a:t>
+            </a:r>
+            <a:endParaRPr lang="fr-FR" dirty="0"/>
+          </a:p>
+        </p:txBody>
+      </p:sp>
+      <p:sp>
+        <p:nvSpPr>
+          <p:cNvPr id="3" name="Espace réservé du contenu 2"/>
+          <p:cNvSpPr>
+            <a:spLocks noGrp="1"/>
+          </p:cNvSpPr>
+          <p:nvPr>
+            <p:ph idx="1"/>
+          </p:nvPr>
+        </p:nvSpPr>
+        <p:spPr>
+          <a:xfrm>
+            <a:off x="457200" y="692696"/>
+            <a:ext cx="8229600" cy="5145435"/>
+          </a:xfrm>
+        </p:spPr>
+        <p:txBody>
+          <a:bodyPr/>
+          <a:lstStyle/>
+          <a:p>
+            <a:pPr>
+              <a:buNone/>
+            </a:pPr>
+            <a:r>
+              <a:rPr lang="fr-FR" dirty="0" smtClean="0"/>
+              <a:t>1) Conversion</a:t>
+            </a:r>
+            <a:endParaRPr lang="fr-FR" dirty="0"/>
+          </a:p>
+        </p:txBody>
+      </p:sp>
+      <p:pic>
+        <p:nvPicPr>
+          <p:cNvPr id="4" name="Image 3"/>
+          <p:cNvPicPr/>
+          <p:nvPr/>
+        </p:nvPicPr>
+        <p:blipFill>
+          <a:blip r:embed="rId2" cstate="print"/>
+          <a:srcRect t="52697" r="17959"/>
+          <a:stretch>
+            <a:fillRect/>
+          </a:stretch>
+        </p:blipFill>
+        <p:spPr bwMode="auto">
+          <a:xfrm>
+            <a:off x="4644008" y="1556792"/>
+            <a:ext cx="3744416" cy="1584176"/>
+          </a:xfrm>
+          <a:prstGeom prst="rect">
+            <a:avLst/>
+          </a:prstGeom>
+          <a:noFill/>
+          <a:ln w="9525">
+            <a:noFill/>
+            <a:miter lim="800000"/>
+            <a:headEnd/>
+            <a:tailEnd/>
+          </a:ln>
+        </p:spPr>
+      </p:pic>
+      <p:pic>
+        <p:nvPicPr>
+          <p:cNvPr id="5" name="Image 4"/>
+          <p:cNvPicPr/>
+          <p:nvPr/>
+        </p:nvPicPr>
+        <p:blipFill>
+          <a:blip r:embed="rId3" cstate="print"/>
+          <a:srcRect t="52500" r="16988"/>
+          <a:stretch>
+            <a:fillRect/>
+          </a:stretch>
+        </p:blipFill>
+        <p:spPr bwMode="auto">
+          <a:xfrm>
+            <a:off x="4644008" y="3861048"/>
+            <a:ext cx="3744416" cy="1584176"/>
+          </a:xfrm>
+          <a:prstGeom prst="rect">
+            <a:avLst/>
+          </a:prstGeom>
+          <a:noFill/>
+          <a:ln w="9525">
+            <a:noFill/>
+            <a:miter lim="800000"/>
+            <a:headEnd/>
+            <a:tailEnd/>
+          </a:ln>
+        </p:spPr>
+      </p:pic>
+      <p:sp>
+        <p:nvSpPr>
+          <p:cNvPr id="6" name="ZoneTexte 5"/>
+          <p:cNvSpPr txBox="1"/>
+          <p:nvPr/>
+        </p:nvSpPr>
+        <p:spPr>
+          <a:xfrm>
+            <a:off x="5868144" y="1196752"/>
+            <a:ext cx="1206549" cy="369332"/>
+          </a:xfrm>
+          <a:prstGeom prst="rect">
+            <a:avLst/>
+          </a:prstGeom>
+          <a:noFill/>
+        </p:spPr>
+        <p:txBody>
+          <a:bodyPr wrap="none" rtlCol="0">
+            <a:spAutoFit/>
+          </a:bodyPr>
+          <a:lstStyle/>
+          <a:p>
+            <a:r>
+              <a:rPr lang="fr-FR" dirty="0" smtClean="0">
+                <a:solidFill>
+                  <a:schemeClr val="tx1">
+                    <a:lumMod val="75000"/>
+                    <a:lumOff val="25000"/>
+                  </a:schemeClr>
+                </a:solidFill>
+              </a:rPr>
+              <a:t>Image RGB</a:t>
+            </a:r>
+            <a:endParaRPr lang="fr-FR" dirty="0">
+              <a:solidFill>
+                <a:schemeClr val="tx1">
+                  <a:lumMod val="75000"/>
+                  <a:lumOff val="25000"/>
+                </a:schemeClr>
+              </a:solidFill>
+            </a:endParaRPr>
+          </a:p>
+        </p:txBody>
+      </p:sp>
+      <p:sp>
+        <p:nvSpPr>
+          <p:cNvPr id="7" name="ZoneTexte 6"/>
+          <p:cNvSpPr txBox="1"/>
+          <p:nvPr/>
+        </p:nvSpPr>
+        <p:spPr>
+          <a:xfrm>
+            <a:off x="5869575" y="5445224"/>
+            <a:ext cx="1366721" cy="369332"/>
+          </a:xfrm>
+          <a:prstGeom prst="rect">
+            <a:avLst/>
+          </a:prstGeom>
+          <a:noFill/>
+        </p:spPr>
+        <p:txBody>
+          <a:bodyPr wrap="none" rtlCol="0">
+            <a:spAutoFit/>
+          </a:bodyPr>
+          <a:lstStyle/>
+          <a:p>
+            <a:r>
+              <a:rPr lang="fr-FR" dirty="0" smtClean="0">
+                <a:solidFill>
+                  <a:schemeClr val="tx1">
+                    <a:lumMod val="75000"/>
+                    <a:lumOff val="25000"/>
+                  </a:schemeClr>
+                </a:solidFill>
+              </a:rPr>
+              <a:t>Image R’G’B’</a:t>
+            </a:r>
+            <a:endParaRPr lang="fr-FR" dirty="0">
+              <a:solidFill>
+                <a:schemeClr val="tx1">
+                  <a:lumMod val="75000"/>
+                  <a:lumOff val="25000"/>
+                </a:schemeClr>
+              </a:solidFill>
+            </a:endParaRPr>
+          </a:p>
+        </p:txBody>
+      </p:sp>
+      <p:sp>
+        <p:nvSpPr>
+          <p:cNvPr id="1028" name="Rectangle 4"/>
+          <p:cNvSpPr>
+            <a:spLocks noChangeArrowheads="1"/>
+          </p:cNvSpPr>
+          <p:nvPr/>
+        </p:nvSpPr>
+        <p:spPr bwMode="auto">
+          <a:xfrm>
+            <a:off x="0" y="0"/>
+            <a:ext cx="9144000" cy="457200"/>
+          </a:xfrm>
+          <a:prstGeom prst="rect">
+            <a:avLst/>
+          </a:prstGeom>
+          <a:noFill/>
+          <a:ln w="9525">
+            <a:noFill/>
+            <a:miter lim="800000"/>
+            <a:headEnd/>
+            <a:tailEnd/>
+          </a:ln>
+          <a:effectLst/>
+        </p:spPr>
+        <p:txBody>
+          <a:bodyPr vert="horz" wrap="none" lIns="91440" tIns="45720" rIns="91440" bIns="45720" numCol="1" anchor="ctr" anchorCtr="0" compatLnSpc="1">
+            <a:prstTxWarp prst="textNoShape">
+              <a:avLst/>
+            </a:prstTxWarp>
+            <a:spAutoFit/>
+          </a:bodyPr>
+          <a:lstStyle/>
+          <a:p>
+            <a:endParaRPr lang="fr-FR"/>
+          </a:p>
+        </p:txBody>
+      </p:sp>
+      <p:sp>
+        <p:nvSpPr>
+          <p:cNvPr id="1029" name="Rectangle 5"/>
+          <p:cNvSpPr>
+            <a:spLocks noChangeArrowheads="1"/>
+          </p:cNvSpPr>
+          <p:nvPr/>
+        </p:nvSpPr>
+        <p:spPr bwMode="auto">
+          <a:xfrm>
+            <a:off x="0" y="800100"/>
+            <a:ext cx="9144000" cy="0"/>
+          </a:xfrm>
+          <a:prstGeom prst="rect">
+            <a:avLst/>
+          </a:prstGeom>
+          <a:noFill/>
+          <a:ln w="9525">
+            <a:noFill/>
+            <a:miter lim="800000"/>
+            <a:headEnd/>
+            <a:tailEnd/>
+          </a:ln>
+          <a:effectLst/>
+        </p:spPr>
+        <p:txBody>
+          <a:bodyPr vert="horz" wrap="none" lIns="91440" tIns="45720" rIns="91440" bIns="45720" numCol="1" anchor="ctr" anchorCtr="0" compatLnSpc="1">
+            <a:prstTxWarp prst="textNoShape">
+              <a:avLst/>
+            </a:prstTxWarp>
+            <a:spAutoFit/>
+          </a:bodyPr>
+          <a:lstStyle/>
+          <a:p>
+            <a:pPr marL="0" marR="0" lvl="0" indent="0" algn="l" defTabSz="914400" rtl="0" eaLnBrk="1" fontAlgn="base" latinLnBrk="0" hangingPunct="1">
+              <a:lnSpc>
+                <a:spcPct val="100000"/>
+              </a:lnSpc>
+              <a:spcBef>
+                <a:spcPct val="0"/>
+              </a:spcBef>
+              <a:spcAft>
+                <a:spcPct val="0"/>
+              </a:spcAft>
+              <a:buClrTx/>
+              <a:buSzTx/>
+              <a:buFontTx/>
+              <a:buNone/>
+              <a:tabLst/>
+            </a:pPr>
+            <a:endParaRPr kumimoji="0" lang="fr-FR" sz="1800" b="0" i="0" u="none" strike="noStrike" cap="none" normalizeH="0" baseline="0" smtClean="0">
+              <a:ln>
+                <a:noFill/>
+              </a:ln>
+              <a:solidFill>
+                <a:schemeClr val="tx1"/>
+              </a:solidFill>
+              <a:effectLst/>
+              <a:latin typeface="Arial" pitchFamily="34" charset="0"/>
+              <a:cs typeface="Arial" pitchFamily="34" charset="0"/>
+            </a:endParaRPr>
+          </a:p>
+        </p:txBody>
+      </p:sp>
+      <p:sp>
+        <p:nvSpPr>
+          <p:cNvPr id="1030" name="Rectangle 6"/>
+          <p:cNvSpPr>
+            <a:spLocks noChangeArrowheads="1"/>
+          </p:cNvSpPr>
+          <p:nvPr/>
+        </p:nvSpPr>
+        <p:spPr bwMode="auto">
+          <a:xfrm>
+            <a:off x="0" y="1143000"/>
+            <a:ext cx="9144000" cy="0"/>
+          </a:xfrm>
+          <a:prstGeom prst="rect">
+            <a:avLst/>
+          </a:prstGeom>
+          <a:noFill/>
+          <a:ln w="9525">
+            <a:noFill/>
+            <a:miter lim="800000"/>
+            <a:headEnd/>
+            <a:tailEnd/>
+          </a:ln>
+          <a:effectLst/>
+        </p:spPr>
+        <p:txBody>
+          <a:bodyPr vert="horz" wrap="none" lIns="91440" tIns="45720" rIns="91440" bIns="45720" numCol="1" anchor="ctr" anchorCtr="0" compatLnSpc="1">
+            <a:prstTxWarp prst="textNoShape">
+              <a:avLst/>
+            </a:prstTxWarp>
+            <a:spAutoFit/>
+          </a:bodyPr>
+          <a:lstStyle/>
+          <a:p>
+            <a:pPr marL="0" marR="0" lvl="0" indent="0" algn="l" defTabSz="914400" rtl="0" eaLnBrk="1" fontAlgn="base" latinLnBrk="0" hangingPunct="1">
+              <a:lnSpc>
+                <a:spcPct val="100000"/>
+              </a:lnSpc>
+              <a:spcBef>
+                <a:spcPct val="0"/>
+              </a:spcBef>
+              <a:spcAft>
+                <a:spcPct val="0"/>
+              </a:spcAft>
+              <a:buClrTx/>
+              <a:buSzTx/>
+              <a:buFontTx/>
+              <a:buNone/>
+              <a:tabLst/>
+            </a:pPr>
+            <a:endParaRPr kumimoji="0" lang="fr-FR" sz="1800" b="0" i="0" u="none" strike="noStrike" cap="none" normalizeH="0" baseline="0" smtClean="0">
+              <a:ln>
+                <a:noFill/>
+              </a:ln>
+              <a:solidFill>
+                <a:schemeClr val="tx1"/>
+              </a:solidFill>
+              <a:effectLst/>
+              <a:latin typeface="Arial" pitchFamily="34" charset="0"/>
+              <a:cs typeface="Arial" pitchFamily="34" charset="0"/>
+            </a:endParaRPr>
+          </a:p>
+        </p:txBody>
+      </p:sp>
+      <p:sp>
+        <p:nvSpPr>
+          <p:cNvPr id="1031" name="Rectangle 7"/>
+          <p:cNvSpPr>
+            <a:spLocks noChangeArrowheads="1"/>
+          </p:cNvSpPr>
+          <p:nvPr/>
+        </p:nvSpPr>
+        <p:spPr bwMode="auto">
+          <a:xfrm>
+            <a:off x="0" y="1485900"/>
+            <a:ext cx="9144000" cy="0"/>
+          </a:xfrm>
+          <a:prstGeom prst="rect">
+            <a:avLst/>
+          </a:prstGeom>
+          <a:noFill/>
+          <a:ln w="9525">
+            <a:noFill/>
+            <a:miter lim="800000"/>
+            <a:headEnd/>
+            <a:tailEnd/>
+          </a:ln>
+          <a:effectLst/>
+        </p:spPr>
+        <p:txBody>
+          <a:bodyPr vert="horz" wrap="none" lIns="91440" tIns="45720" rIns="91440" bIns="45720" numCol="1" anchor="ctr" anchorCtr="0" compatLnSpc="1">
+            <a:prstTxWarp prst="textNoShape">
+              <a:avLst/>
+            </a:prstTxWarp>
+            <a:spAutoFit/>
+          </a:bodyPr>
+          <a:lstStyle/>
+          <a:p>
+            <a:pPr marL="0" marR="0" lvl="0" indent="0" algn="l" defTabSz="914400" rtl="0" eaLnBrk="1" fontAlgn="base" latinLnBrk="0" hangingPunct="1">
+              <a:lnSpc>
+                <a:spcPct val="100000"/>
+              </a:lnSpc>
+              <a:spcBef>
+                <a:spcPct val="0"/>
+              </a:spcBef>
+              <a:spcAft>
+                <a:spcPct val="0"/>
+              </a:spcAft>
+              <a:buClrTx/>
+              <a:buSzTx/>
+              <a:buFontTx/>
+              <a:buNone/>
+              <a:tabLst/>
+            </a:pPr>
+            <a:endParaRPr kumimoji="0" lang="fr-FR" sz="1800" b="0" i="0" u="none" strike="noStrike" cap="none" normalizeH="0" baseline="0" smtClean="0">
+              <a:ln>
+                <a:noFill/>
+              </a:ln>
+              <a:solidFill>
+                <a:schemeClr val="tx1"/>
+              </a:solidFill>
+              <a:effectLst/>
+              <a:latin typeface="Arial" pitchFamily="34" charset="0"/>
+              <a:cs typeface="Arial" pitchFamily="34" charset="0"/>
+            </a:endParaRPr>
+          </a:p>
+        </p:txBody>
+      </p:sp>
+      <p:pic>
+        <p:nvPicPr>
+          <p:cNvPr id="1032" name="Picture 8"/>
+          <p:cNvPicPr>
+            <a:picLocks noChangeAspect="1" noChangeArrowheads="1"/>
+          </p:cNvPicPr>
+          <p:nvPr/>
+        </p:nvPicPr>
+        <p:blipFill>
+          <a:blip r:embed="rId4" cstate="print"/>
+          <a:srcRect/>
+          <a:stretch>
+            <a:fillRect/>
+          </a:stretch>
+        </p:blipFill>
+        <p:spPr bwMode="auto">
+          <a:xfrm>
+            <a:off x="541412" y="1700808"/>
+            <a:ext cx="3238500" cy="3600450"/>
+          </a:xfrm>
+          <a:prstGeom prst="rect">
+            <a:avLst/>
+          </a:prstGeom>
+          <a:noFill/>
+          <a:ln w="9525">
+            <a:noFill/>
+            <a:miter lim="800000"/>
+            <a:headEnd/>
+            <a:tailEnd/>
+          </a:ln>
+        </p:spPr>
+      </p:pic>
+      <p:cxnSp>
+        <p:nvCxnSpPr>
+          <p:cNvPr id="17" name="Connecteur droit avec flèche 16"/>
+          <p:cNvCxnSpPr/>
+          <p:nvPr/>
+        </p:nvCxnSpPr>
+        <p:spPr>
+          <a:xfrm>
+            <a:off x="6516216" y="3284984"/>
+            <a:ext cx="0" cy="432048"/>
+          </a:xfrm>
+          <a:prstGeom prst="straightConnector1">
+            <a:avLst/>
+          </a:prstGeom>
+          <a:ln>
+            <a:solidFill>
+              <a:schemeClr val="tx1">
+                <a:lumMod val="75000"/>
+                <a:lumOff val="25000"/>
+              </a:schemeClr>
+            </a:solidFill>
+            <a:tailEnd type="arrow"/>
+          </a:ln>
+        </p:spPr>
+        <p:style>
+          <a:lnRef idx="1">
+            <a:schemeClr val="accent1"/>
+          </a:lnRef>
+          <a:fillRef idx="0">
+            <a:schemeClr val="accent1"/>
+          </a:fillRef>
+          <a:effectRef idx="0">
+            <a:schemeClr val="accent1"/>
+          </a:effectRef>
+          <a:fontRef idx="minor">
+            <a:schemeClr val="tx1"/>
+          </a:fontRef>
+        </p:style>
+      </p:cxnSp>
+      <p:sp>
+        <p:nvSpPr>
+          <p:cNvPr id="15" name="Espace réservé du numéro de diapositive 3">
             <a:extLst>
               <a:ext uri="{FF2B5EF4-FFF2-40B4-BE49-F238E27FC236}">
-                <a16:creationId xmlns:a16="http://schemas.microsoft.com/office/drawing/2014/main" id="{78DA7573-D10D-4AEB-96D9-FF4F5408A076}"/>
+                <a16:creationId xmlns="" xmlns:a16="http://schemas.microsoft.com/office/drawing/2014/main" id="{548BDFC5-6BC7-471F-83CF-D0E185D5CA6E}"/>
               </a:ext>
             </a:extLst>
           </p:cNvPr>
@@ -5407,10 +6884,98 @@
             <a:spLocks noGrp="1"/>
           </p:cNvSpPr>
           <p:nvPr>
+            <p:ph type="sldNum" sz="quarter" idx="4"/>
+          </p:nvPr>
+        </p:nvSpPr>
+        <p:spPr>
+          <a:xfrm>
+            <a:off x="6892822" y="6453336"/>
+            <a:ext cx="2133600" cy="365125"/>
+          </a:xfrm>
+        </p:spPr>
+        <p:txBody>
+          <a:bodyPr/>
+          <a:lstStyle/>
+          <a:p>
+            <a:r>
+              <a:rPr lang="fr-FR"/>
+              <a:t>	</a:t>
+            </a:r>
+            <a:fld id="{09390BE9-E4CD-414E-A8A9-9535CDDB3176}" type="slidenum">
+              <a:rPr lang="fr-FR" sz="2000" smtClean="0"/>
+              <a:pPr/>
+              <a:t>6</a:t>
+            </a:fld>
+            <a:endParaRPr lang="fr-FR" sz="2000" dirty="0"/>
+          </a:p>
+        </p:txBody>
+      </p:sp>
+      <p:sp>
+        <p:nvSpPr>
+          <p:cNvPr id="16" name="Espace réservé de la date 4">
+            <a:extLst>
+              <a:ext uri="{FF2B5EF4-FFF2-40B4-BE49-F238E27FC236}">
+                <a16:creationId xmlns="" xmlns:a16="http://schemas.microsoft.com/office/drawing/2014/main" id="{7DF21FB1-2057-406C-B73E-759C76CCE0D8}"/>
+              </a:ext>
+            </a:extLst>
+          </p:cNvPr>
+          <p:cNvSpPr>
+            <a:spLocks noGrp="1"/>
+          </p:cNvSpPr>
+          <p:nvPr>
+            <p:ph type="dt" sz="half" idx="2"/>
+          </p:nvPr>
+        </p:nvSpPr>
+        <p:spPr>
+          <a:xfrm>
+            <a:off x="107504" y="6547352"/>
+            <a:ext cx="1656184" cy="365125"/>
+          </a:xfrm>
+        </p:spPr>
+        <p:txBody>
+          <a:bodyPr/>
+          <a:lstStyle/>
+          <a:p>
+            <a:r>
+              <a:rPr lang="fr-FR" dirty="0"/>
+              <a:t>IN52</a:t>
+            </a:r>
+            <a:br>
+              <a:rPr lang="fr-FR" dirty="0"/>
+            </a:br>
+            <a:r>
+              <a:rPr lang="fr-FR" dirty="0"/>
+              <a:t>IN54</a:t>
+            </a:r>
+            <a:br>
+              <a:rPr lang="fr-FR" dirty="0"/>
+            </a:br>
+            <a:endParaRPr lang="fr-FR" dirty="0"/>
+          </a:p>
+        </p:txBody>
+      </p:sp>
+      <p:sp>
+        <p:nvSpPr>
+          <p:cNvPr id="18" name="Espace réservé du pied de page 5">
+            <a:extLst>
+              <a:ext uri="{FF2B5EF4-FFF2-40B4-BE49-F238E27FC236}">
+                <a16:creationId xmlns="" xmlns:a16="http://schemas.microsoft.com/office/drawing/2014/main" id="{78DA7573-D10D-4AEB-96D9-FF4F5408A076}"/>
+              </a:ext>
+            </a:extLst>
+          </p:cNvPr>
+          <p:cNvSpPr>
+            <a:spLocks noGrp="1"/>
+          </p:cNvSpPr>
+          <p:nvPr>
             <p:ph type="ftr" sz="quarter" idx="3"/>
           </p:nvPr>
         </p:nvSpPr>
-        <p:spPr/>
+        <p:spPr>
+          <a:xfrm>
+            <a:off x="1769087" y="6459892"/>
+            <a:ext cx="5328592" cy="365125"/>
+          </a:xfrm>
+        </p:spPr>
         <p:txBody>
           <a:bodyPr/>
           <a:lstStyle/>
@@ -5431,11 +6996,1446 @@
         </p:txBody>
       </p:sp>
     </p:spTree>
-    <p:extLst>
-      <p:ext uri="{BB962C8B-B14F-4D97-AF65-F5344CB8AC3E}">
-        <p14:creationId xmlns:p14="http://schemas.microsoft.com/office/powerpoint/2010/main" val="1413229723"/>
-      </p:ext>
-    </p:extLst>
+  </p:cSld>
+  <p:clrMapOvr>
+    <a:masterClrMapping/>
+  </p:clrMapOvr>
+</p:sld>
+</file>
+
+<file path=ppt/slides/slide7.xml><?xml version="1.0" encoding="utf-8"?>
+<p:sld xmlns:a="http://schemas.openxmlformats.org/drawingml/2006/main" xmlns:r="http://schemas.openxmlformats.org/officeDocument/2006/relationships" xmlns:p="http://schemas.openxmlformats.org/presentationml/2006/main">
+  <p:cSld>
+    <p:spTree>
+      <p:nvGrpSpPr>
+        <p:cNvPr id="1" name=""/>
+        <p:cNvGrpSpPr/>
+        <p:nvPr/>
+      </p:nvGrpSpPr>
+      <p:grpSpPr>
+        <a:xfrm>
+          <a:off x="0" y="0"/>
+          <a:ext cx="0" cy="0"/>
+          <a:chOff x="0" y="0"/>
+          <a:chExt cx="0" cy="0"/>
+        </a:xfrm>
+      </p:grpSpPr>
+      <p:cxnSp>
+        <p:nvCxnSpPr>
+          <p:cNvPr id="11" name="Connecteur droit avec flèche 10"/>
+          <p:cNvCxnSpPr/>
+          <p:nvPr/>
+        </p:nvCxnSpPr>
+        <p:spPr>
+          <a:xfrm>
+            <a:off x="1115616" y="3356992"/>
+            <a:ext cx="0" cy="1037785"/>
+          </a:xfrm>
+          <a:prstGeom prst="straightConnector1">
+            <a:avLst/>
+          </a:prstGeom>
+          <a:ln>
+            <a:solidFill>
+              <a:schemeClr val="tx1"/>
+            </a:solidFill>
+            <a:tailEnd type="arrow"/>
+          </a:ln>
+        </p:spPr>
+        <p:style>
+          <a:lnRef idx="1">
+            <a:schemeClr val="accent1"/>
+          </a:lnRef>
+          <a:fillRef idx="0">
+            <a:schemeClr val="accent1"/>
+          </a:fillRef>
+          <a:effectRef idx="0">
+            <a:schemeClr val="accent1"/>
+          </a:effectRef>
+          <a:fontRef idx="minor">
+            <a:schemeClr val="tx1"/>
+          </a:fontRef>
+        </p:style>
+      </p:cxnSp>
+      <p:cxnSp>
+        <p:nvCxnSpPr>
+          <p:cNvPr id="20" name="Connecteur en angle 19"/>
+          <p:cNvCxnSpPr>
+            <a:stCxn id="29" idx="4"/>
+            <a:endCxn id="32" idx="0"/>
+          </p:cNvCxnSpPr>
+          <p:nvPr/>
+        </p:nvCxnSpPr>
+        <p:spPr>
+          <a:xfrm rot="5400000">
+            <a:off x="2748322" y="2255054"/>
+            <a:ext cx="1055068" cy="3240360"/>
+          </a:xfrm>
+          <a:prstGeom prst="bentConnector3">
+            <a:avLst>
+              <a:gd name="adj1" fmla="val 50000"/>
+            </a:avLst>
+          </a:prstGeom>
+          <a:ln>
+            <a:solidFill>
+              <a:schemeClr val="tx1"/>
+            </a:solidFill>
+            <a:tailEnd type="arrow"/>
+          </a:ln>
+        </p:spPr>
+        <p:style>
+          <a:lnRef idx="1">
+            <a:schemeClr val="accent1"/>
+          </a:lnRef>
+          <a:fillRef idx="0">
+            <a:schemeClr val="accent1"/>
+          </a:fillRef>
+          <a:effectRef idx="0">
+            <a:schemeClr val="accent1"/>
+          </a:effectRef>
+          <a:fontRef idx="minor">
+            <a:schemeClr val="tx1"/>
+          </a:fontRef>
+        </p:style>
+      </p:cxnSp>
+      <p:sp>
+        <p:nvSpPr>
+          <p:cNvPr id="2" name="Titre 1"/>
+          <p:cNvSpPr>
+            <a:spLocks noGrp="1"/>
+          </p:cNvSpPr>
+          <p:nvPr>
+            <p:ph type="title"/>
+          </p:nvPr>
+        </p:nvSpPr>
+        <p:spPr/>
+        <p:txBody>
+          <a:bodyPr/>
+          <a:lstStyle/>
+          <a:p>
+            <a:r>
+              <a:rPr lang="fr-FR" dirty="0" smtClean="0"/>
+              <a:t>II. </a:t>
+            </a:r>
+            <a:r>
+              <a:rPr lang="fr-FR" dirty="0" smtClean="0"/>
+              <a:t>Méthode </a:t>
+            </a:r>
+            <a:r>
+              <a:rPr lang="fr-FR" dirty="0" smtClean="0"/>
+              <a:t>implémentée</a:t>
+            </a:r>
+            <a:endParaRPr lang="fr-FR" dirty="0"/>
+          </a:p>
+        </p:txBody>
+      </p:sp>
+      <p:sp>
+        <p:nvSpPr>
+          <p:cNvPr id="3" name="Espace réservé du contenu 2"/>
+          <p:cNvSpPr>
+            <a:spLocks noGrp="1"/>
+          </p:cNvSpPr>
+          <p:nvPr>
+            <p:ph idx="1"/>
+          </p:nvPr>
+        </p:nvSpPr>
+        <p:spPr>
+          <a:xfrm>
+            <a:off x="457200" y="731837"/>
+            <a:ext cx="8229600" cy="5145435"/>
+          </a:xfrm>
+        </p:spPr>
+        <p:txBody>
+          <a:bodyPr/>
+          <a:lstStyle/>
+          <a:p>
+            <a:pPr>
+              <a:buNone/>
+            </a:pPr>
+            <a:r>
+              <a:rPr lang="fr-FR" dirty="0" smtClean="0"/>
+              <a:t>2) Segmentation</a:t>
+            </a:r>
+            <a:endParaRPr lang="fr-FR" dirty="0"/>
+          </a:p>
+        </p:txBody>
+      </p:sp>
+      <p:pic>
+        <p:nvPicPr>
+          <p:cNvPr id="4" name="Image 3"/>
+          <p:cNvPicPr/>
+          <p:nvPr/>
+        </p:nvPicPr>
+        <p:blipFill>
+          <a:blip r:embed="rId2" cstate="print"/>
+          <a:srcRect t="52140" r="18087"/>
+          <a:stretch>
+            <a:fillRect/>
+          </a:stretch>
+        </p:blipFill>
+        <p:spPr bwMode="auto">
+          <a:xfrm>
+            <a:off x="4499992" y="1628800"/>
+            <a:ext cx="3960440" cy="1800200"/>
+          </a:xfrm>
+          <a:prstGeom prst="rect">
+            <a:avLst/>
+          </a:prstGeom>
+          <a:noFill/>
+          <a:ln w="9525">
+            <a:noFill/>
+            <a:miter lim="800000"/>
+            <a:headEnd/>
+            <a:tailEnd/>
+          </a:ln>
+        </p:spPr>
+      </p:pic>
+      <p:pic>
+        <p:nvPicPr>
+          <p:cNvPr id="5" name="Image 4"/>
+          <p:cNvPicPr/>
+          <p:nvPr/>
+        </p:nvPicPr>
+        <p:blipFill>
+          <a:blip r:embed="rId3" cstate="print"/>
+          <a:srcRect t="52510" r="18019"/>
+          <a:stretch>
+            <a:fillRect/>
+          </a:stretch>
+        </p:blipFill>
+        <p:spPr bwMode="auto">
+          <a:xfrm>
+            <a:off x="395536" y="1628800"/>
+            <a:ext cx="3960440" cy="1790908"/>
+          </a:xfrm>
+          <a:prstGeom prst="rect">
+            <a:avLst/>
+          </a:prstGeom>
+          <a:noFill/>
+          <a:ln w="9525">
+            <a:noFill/>
+            <a:miter lim="800000"/>
+            <a:headEnd/>
+            <a:tailEnd/>
+          </a:ln>
+        </p:spPr>
+      </p:pic>
+      <p:pic>
+        <p:nvPicPr>
+          <p:cNvPr id="6" name="Image 5"/>
+          <p:cNvPicPr/>
+          <p:nvPr/>
+        </p:nvPicPr>
+        <p:blipFill>
+          <a:blip r:embed="rId4" cstate="print"/>
+          <a:srcRect l="2710" t="47500" r="21720" b="4583"/>
+          <a:stretch>
+            <a:fillRect/>
+          </a:stretch>
+        </p:blipFill>
+        <p:spPr bwMode="auto">
+          <a:xfrm>
+            <a:off x="5652120" y="4365190"/>
+            <a:ext cx="2952328" cy="1224136"/>
+          </a:xfrm>
+          <a:prstGeom prst="rect">
+            <a:avLst/>
+          </a:prstGeom>
+          <a:noFill/>
+          <a:ln w="9525">
+            <a:noFill/>
+            <a:miter lim="800000"/>
+            <a:headEnd/>
+            <a:tailEnd/>
+          </a:ln>
+        </p:spPr>
+      </p:pic>
+      <p:sp>
+        <p:nvSpPr>
+          <p:cNvPr id="8" name="Rectangle 7"/>
+          <p:cNvSpPr/>
+          <p:nvPr/>
+        </p:nvSpPr>
+        <p:spPr>
+          <a:xfrm>
+            <a:off x="539552" y="4402768"/>
+            <a:ext cx="1584176" cy="1008112"/>
+          </a:xfrm>
+          <a:prstGeom prst="rect">
+            <a:avLst/>
+          </a:prstGeom>
+          <a:solidFill>
+            <a:schemeClr val="bg1"/>
+          </a:solidFill>
+          <a:ln>
+            <a:solidFill>
+              <a:schemeClr val="tx1">
+                <a:lumMod val="75000"/>
+                <a:lumOff val="25000"/>
+              </a:schemeClr>
+            </a:solidFill>
+          </a:ln>
+        </p:spPr>
+        <p:style>
+          <a:lnRef idx="2">
+            <a:schemeClr val="accent1">
+              <a:shade val="50000"/>
+            </a:schemeClr>
+          </a:lnRef>
+          <a:fillRef idx="1">
+            <a:schemeClr val="accent1"/>
+          </a:fillRef>
+          <a:effectRef idx="0">
+            <a:schemeClr val="accent1"/>
+          </a:effectRef>
+          <a:fontRef idx="minor">
+            <a:schemeClr val="lt1"/>
+          </a:fontRef>
+        </p:style>
+        <p:txBody>
+          <a:bodyPr rtlCol="0" anchor="ctr"/>
+          <a:lstStyle/>
+          <a:p>
+            <a:pPr algn="ctr"/>
+            <a:r>
+              <a:rPr lang="fr-FR" dirty="0" smtClean="0">
+                <a:solidFill>
+                  <a:schemeClr val="tx1"/>
+                </a:solidFill>
+              </a:rPr>
+              <a:t>Seuillage optimal d’Otsu</a:t>
+            </a:r>
+            <a:endParaRPr lang="fr-FR" dirty="0">
+              <a:solidFill>
+                <a:schemeClr val="tx1"/>
+              </a:solidFill>
+            </a:endParaRPr>
+          </a:p>
+        </p:txBody>
+      </p:sp>
+      <p:sp>
+        <p:nvSpPr>
+          <p:cNvPr id="9" name="Rectangle 8"/>
+          <p:cNvSpPr/>
+          <p:nvPr/>
+        </p:nvSpPr>
+        <p:spPr>
+          <a:xfrm>
+            <a:off x="3779912" y="4618792"/>
+            <a:ext cx="1080120" cy="720080"/>
+          </a:xfrm>
+          <a:prstGeom prst="rect">
+            <a:avLst/>
+          </a:prstGeom>
+          <a:solidFill>
+            <a:schemeClr val="bg1"/>
+          </a:solidFill>
+          <a:ln>
+            <a:solidFill>
+              <a:schemeClr val="tx1">
+                <a:lumMod val="75000"/>
+                <a:lumOff val="25000"/>
+              </a:schemeClr>
+            </a:solidFill>
+          </a:ln>
+        </p:spPr>
+        <p:style>
+          <a:lnRef idx="2">
+            <a:schemeClr val="accent1">
+              <a:shade val="50000"/>
+            </a:schemeClr>
+          </a:lnRef>
+          <a:fillRef idx="1">
+            <a:schemeClr val="accent1"/>
+          </a:fillRef>
+          <a:effectRef idx="0">
+            <a:schemeClr val="accent1"/>
+          </a:effectRef>
+          <a:fontRef idx="minor">
+            <a:schemeClr val="lt1"/>
+          </a:fontRef>
+        </p:style>
+        <p:txBody>
+          <a:bodyPr rtlCol="0" anchor="ctr"/>
+          <a:lstStyle/>
+          <a:p>
+            <a:pPr algn="ctr"/>
+            <a:r>
+              <a:rPr lang="fr-FR" dirty="0" smtClean="0">
+                <a:solidFill>
+                  <a:schemeClr val="tx1"/>
+                </a:solidFill>
+              </a:rPr>
+              <a:t>Produit</a:t>
+            </a:r>
+            <a:endParaRPr lang="fr-FR" dirty="0">
+              <a:solidFill>
+                <a:schemeClr val="tx1"/>
+              </a:solidFill>
+            </a:endParaRPr>
+          </a:p>
+        </p:txBody>
+      </p:sp>
+      <p:sp>
+        <p:nvSpPr>
+          <p:cNvPr id="29" name="Ellipse 28"/>
+          <p:cNvSpPr/>
+          <p:nvPr/>
+        </p:nvSpPr>
+        <p:spPr>
+          <a:xfrm>
+            <a:off x="4716016" y="3059668"/>
+            <a:ext cx="360040" cy="288032"/>
+          </a:xfrm>
+          <a:prstGeom prst="ellipse">
+            <a:avLst/>
+          </a:prstGeom>
+          <a:noFill/>
+          <a:ln>
+            <a:noFill/>
+          </a:ln>
+        </p:spPr>
+        <p:style>
+          <a:lnRef idx="2">
+            <a:schemeClr val="accent1">
+              <a:shade val="50000"/>
+            </a:schemeClr>
+          </a:lnRef>
+          <a:fillRef idx="1">
+            <a:schemeClr val="accent1"/>
+          </a:fillRef>
+          <a:effectRef idx="0">
+            <a:schemeClr val="accent1"/>
+          </a:effectRef>
+          <a:fontRef idx="minor">
+            <a:schemeClr val="lt1"/>
+          </a:fontRef>
+        </p:style>
+        <p:txBody>
+          <a:bodyPr rtlCol="0" anchor="ctr"/>
+          <a:lstStyle/>
+          <a:p>
+            <a:pPr algn="ctr"/>
+            <a:endParaRPr lang="fr-FR"/>
+          </a:p>
+        </p:txBody>
+      </p:sp>
+      <p:sp>
+        <p:nvSpPr>
+          <p:cNvPr id="32" name="Ellipse 31"/>
+          <p:cNvSpPr/>
+          <p:nvPr/>
+        </p:nvSpPr>
+        <p:spPr>
+          <a:xfrm>
+            <a:off x="1475656" y="4402768"/>
+            <a:ext cx="360040" cy="288032"/>
+          </a:xfrm>
+          <a:prstGeom prst="ellipse">
+            <a:avLst/>
+          </a:prstGeom>
+          <a:noFill/>
+          <a:ln>
+            <a:noFill/>
+          </a:ln>
+        </p:spPr>
+        <p:style>
+          <a:lnRef idx="2">
+            <a:schemeClr val="accent1">
+              <a:shade val="50000"/>
+            </a:schemeClr>
+          </a:lnRef>
+          <a:fillRef idx="1">
+            <a:schemeClr val="accent1"/>
+          </a:fillRef>
+          <a:effectRef idx="0">
+            <a:schemeClr val="accent1"/>
+          </a:effectRef>
+          <a:fontRef idx="minor">
+            <a:schemeClr val="lt1"/>
+          </a:fontRef>
+        </p:style>
+        <p:txBody>
+          <a:bodyPr rtlCol="0" anchor="ctr"/>
+          <a:lstStyle/>
+          <a:p>
+            <a:pPr algn="ctr"/>
+            <a:endParaRPr lang="fr-FR"/>
+          </a:p>
+        </p:txBody>
+      </p:sp>
+      <p:cxnSp>
+        <p:nvCxnSpPr>
+          <p:cNvPr id="34" name="Connecteur droit avec flèche 33"/>
+          <p:cNvCxnSpPr/>
+          <p:nvPr/>
+        </p:nvCxnSpPr>
+        <p:spPr>
+          <a:xfrm>
+            <a:off x="2123728" y="4762808"/>
+            <a:ext cx="1656184" cy="0"/>
+          </a:xfrm>
+          <a:prstGeom prst="straightConnector1">
+            <a:avLst/>
+          </a:prstGeom>
+          <a:ln>
+            <a:solidFill>
+              <a:schemeClr val="tx1"/>
+            </a:solidFill>
+            <a:tailEnd type="arrow"/>
+          </a:ln>
+        </p:spPr>
+        <p:style>
+          <a:lnRef idx="1">
+            <a:schemeClr val="accent1"/>
+          </a:lnRef>
+          <a:fillRef idx="0">
+            <a:schemeClr val="accent1"/>
+          </a:fillRef>
+          <a:effectRef idx="0">
+            <a:schemeClr val="accent1"/>
+          </a:effectRef>
+          <a:fontRef idx="minor">
+            <a:schemeClr val="tx1"/>
+          </a:fontRef>
+        </p:style>
+      </p:cxnSp>
+      <p:cxnSp>
+        <p:nvCxnSpPr>
+          <p:cNvPr id="38" name="Connecteur droit avec flèche 37"/>
+          <p:cNvCxnSpPr/>
+          <p:nvPr/>
+        </p:nvCxnSpPr>
+        <p:spPr>
+          <a:xfrm>
+            <a:off x="2123728" y="5122848"/>
+            <a:ext cx="1656184" cy="0"/>
+          </a:xfrm>
+          <a:prstGeom prst="straightConnector1">
+            <a:avLst/>
+          </a:prstGeom>
+          <a:ln>
+            <a:solidFill>
+              <a:schemeClr val="tx1"/>
+            </a:solidFill>
+            <a:tailEnd type="arrow"/>
+          </a:ln>
+        </p:spPr>
+        <p:style>
+          <a:lnRef idx="1">
+            <a:schemeClr val="accent1"/>
+          </a:lnRef>
+          <a:fillRef idx="0">
+            <a:schemeClr val="accent1"/>
+          </a:fillRef>
+          <a:effectRef idx="0">
+            <a:schemeClr val="accent1"/>
+          </a:effectRef>
+          <a:fontRef idx="minor">
+            <a:schemeClr val="tx1"/>
+          </a:fontRef>
+        </p:style>
+      </p:cxnSp>
+      <p:sp>
+        <p:nvSpPr>
+          <p:cNvPr id="41" name="ZoneTexte 40"/>
+          <p:cNvSpPr txBox="1"/>
+          <p:nvPr/>
+        </p:nvSpPr>
+        <p:spPr>
+          <a:xfrm>
+            <a:off x="755576" y="3429000"/>
+            <a:ext cx="367408" cy="369332"/>
+          </a:xfrm>
+          <a:prstGeom prst="rect">
+            <a:avLst/>
+          </a:prstGeom>
+          <a:noFill/>
+        </p:spPr>
+        <p:txBody>
+          <a:bodyPr wrap="none" rtlCol="0">
+            <a:spAutoFit/>
+          </a:bodyPr>
+          <a:lstStyle/>
+          <a:p>
+            <a:r>
+              <a:rPr lang="fr-FR" dirty="0" smtClean="0"/>
+              <a:t>R’</a:t>
+            </a:r>
+            <a:endParaRPr lang="fr-FR" dirty="0"/>
+          </a:p>
+        </p:txBody>
+      </p:sp>
+      <p:sp>
+        <p:nvSpPr>
+          <p:cNvPr id="42" name="ZoneTexte 41"/>
+          <p:cNvSpPr txBox="1"/>
+          <p:nvPr/>
+        </p:nvSpPr>
+        <p:spPr>
+          <a:xfrm>
+            <a:off x="4906988" y="3419708"/>
+            <a:ext cx="367408" cy="369332"/>
+          </a:xfrm>
+          <a:prstGeom prst="rect">
+            <a:avLst/>
+          </a:prstGeom>
+          <a:noFill/>
+        </p:spPr>
+        <p:txBody>
+          <a:bodyPr wrap="none" rtlCol="0">
+            <a:spAutoFit/>
+          </a:bodyPr>
+          <a:lstStyle/>
+          <a:p>
+            <a:r>
+              <a:rPr lang="fr-FR" dirty="0"/>
+              <a:t>B</a:t>
+            </a:r>
+            <a:r>
+              <a:rPr lang="fr-FR" dirty="0" smtClean="0"/>
+              <a:t>’</a:t>
+            </a:r>
+            <a:endParaRPr lang="fr-FR" dirty="0"/>
+          </a:p>
+        </p:txBody>
+      </p:sp>
+      <p:sp>
+        <p:nvSpPr>
+          <p:cNvPr id="43" name="ZoneTexte 42"/>
+          <p:cNvSpPr txBox="1"/>
+          <p:nvPr/>
+        </p:nvSpPr>
+        <p:spPr>
+          <a:xfrm>
+            <a:off x="2339752" y="4402768"/>
+            <a:ext cx="1176925" cy="369332"/>
+          </a:xfrm>
+          <a:prstGeom prst="rect">
+            <a:avLst/>
+          </a:prstGeom>
+          <a:noFill/>
+        </p:spPr>
+        <p:txBody>
+          <a:bodyPr wrap="none" rtlCol="0">
+            <a:spAutoFit/>
+          </a:bodyPr>
+          <a:lstStyle/>
+          <a:p>
+            <a:r>
+              <a:rPr lang="fr-FR" dirty="0" smtClean="0"/>
+              <a:t>Masque R’</a:t>
+            </a:r>
+            <a:endParaRPr lang="fr-FR" dirty="0"/>
+          </a:p>
+        </p:txBody>
+      </p:sp>
+      <p:sp>
+        <p:nvSpPr>
+          <p:cNvPr id="44" name="ZoneTexte 43"/>
+          <p:cNvSpPr txBox="1"/>
+          <p:nvPr/>
+        </p:nvSpPr>
+        <p:spPr>
+          <a:xfrm>
+            <a:off x="2339752" y="5113556"/>
+            <a:ext cx="1176925" cy="369332"/>
+          </a:xfrm>
+          <a:prstGeom prst="rect">
+            <a:avLst/>
+          </a:prstGeom>
+          <a:noFill/>
+        </p:spPr>
+        <p:txBody>
+          <a:bodyPr wrap="none" rtlCol="0">
+            <a:spAutoFit/>
+          </a:bodyPr>
+          <a:lstStyle/>
+          <a:p>
+            <a:r>
+              <a:rPr lang="fr-FR" dirty="0" smtClean="0"/>
+              <a:t>Masque B’</a:t>
+            </a:r>
+            <a:endParaRPr lang="fr-FR" dirty="0"/>
+          </a:p>
+        </p:txBody>
+      </p:sp>
+      <p:cxnSp>
+        <p:nvCxnSpPr>
+          <p:cNvPr id="45" name="Connecteur droit avec flèche 44"/>
+          <p:cNvCxnSpPr>
+            <a:stCxn id="9" idx="3"/>
+            <a:endCxn id="6" idx="1"/>
+          </p:cNvCxnSpPr>
+          <p:nvPr/>
+        </p:nvCxnSpPr>
+        <p:spPr>
+          <a:xfrm flipV="1">
+            <a:off x="4860032" y="4977258"/>
+            <a:ext cx="792088" cy="1574"/>
+          </a:xfrm>
+          <a:prstGeom prst="straightConnector1">
+            <a:avLst/>
+          </a:prstGeom>
+          <a:ln>
+            <a:solidFill>
+              <a:schemeClr val="tx1"/>
+            </a:solidFill>
+            <a:tailEnd type="arrow"/>
+          </a:ln>
+        </p:spPr>
+        <p:style>
+          <a:lnRef idx="1">
+            <a:schemeClr val="accent1"/>
+          </a:lnRef>
+          <a:fillRef idx="0">
+            <a:schemeClr val="accent1"/>
+          </a:fillRef>
+          <a:effectRef idx="0">
+            <a:schemeClr val="accent1"/>
+          </a:effectRef>
+          <a:fontRef idx="minor">
+            <a:schemeClr val="tx1"/>
+          </a:fontRef>
+        </p:style>
+      </p:cxnSp>
+      <p:sp>
+        <p:nvSpPr>
+          <p:cNvPr id="48" name="ZoneTexte 47"/>
+          <p:cNvSpPr txBox="1"/>
+          <p:nvPr/>
+        </p:nvSpPr>
+        <p:spPr>
+          <a:xfrm>
+            <a:off x="6444208" y="5596882"/>
+            <a:ext cx="1465338" cy="369332"/>
+          </a:xfrm>
+          <a:prstGeom prst="rect">
+            <a:avLst/>
+          </a:prstGeom>
+          <a:noFill/>
+        </p:spPr>
+        <p:txBody>
+          <a:bodyPr wrap="none" rtlCol="0">
+            <a:spAutoFit/>
+          </a:bodyPr>
+          <a:lstStyle/>
+          <a:p>
+            <a:pPr algn="ctr"/>
+            <a:r>
+              <a:rPr lang="fr-FR" dirty="0" smtClean="0"/>
+              <a:t>Image binaire</a:t>
+            </a:r>
+            <a:endParaRPr lang="fr-FR" dirty="0"/>
+          </a:p>
+        </p:txBody>
+      </p:sp>
+      <p:sp>
+        <p:nvSpPr>
+          <p:cNvPr id="22" name="Espace réservé du numéro de diapositive 3">
+            <a:extLst>
+              <a:ext uri="{FF2B5EF4-FFF2-40B4-BE49-F238E27FC236}">
+                <a16:creationId xmlns="" xmlns:a16="http://schemas.microsoft.com/office/drawing/2014/main" id="{548BDFC5-6BC7-471F-83CF-D0E185D5CA6E}"/>
+              </a:ext>
+            </a:extLst>
+          </p:cNvPr>
+          <p:cNvSpPr>
+            <a:spLocks noGrp="1"/>
+          </p:cNvSpPr>
+          <p:nvPr>
+            <p:ph type="sldNum" sz="quarter" idx="4"/>
+          </p:nvPr>
+        </p:nvSpPr>
+        <p:spPr>
+          <a:xfrm>
+            <a:off x="6892822" y="6453336"/>
+            <a:ext cx="2133600" cy="365125"/>
+          </a:xfrm>
+        </p:spPr>
+        <p:txBody>
+          <a:bodyPr/>
+          <a:lstStyle/>
+          <a:p>
+            <a:r>
+              <a:rPr lang="fr-FR"/>
+              <a:t>	</a:t>
+            </a:r>
+            <a:fld id="{09390BE9-E4CD-414E-A8A9-9535CDDB3176}" type="slidenum">
+              <a:rPr lang="fr-FR" sz="2000" smtClean="0"/>
+              <a:pPr/>
+              <a:t>7</a:t>
+            </a:fld>
+            <a:endParaRPr lang="fr-FR" sz="2000" dirty="0"/>
+          </a:p>
+        </p:txBody>
+      </p:sp>
+      <p:sp>
+        <p:nvSpPr>
+          <p:cNvPr id="24" name="Espace réservé de la date 4">
+            <a:extLst>
+              <a:ext uri="{FF2B5EF4-FFF2-40B4-BE49-F238E27FC236}">
+                <a16:creationId xmlns="" xmlns:a16="http://schemas.microsoft.com/office/drawing/2014/main" id="{7DF21FB1-2057-406C-B73E-759C76CCE0D8}"/>
+              </a:ext>
+            </a:extLst>
+          </p:cNvPr>
+          <p:cNvSpPr>
+            <a:spLocks noGrp="1"/>
+          </p:cNvSpPr>
+          <p:nvPr>
+            <p:ph type="dt" sz="half" idx="2"/>
+          </p:nvPr>
+        </p:nvSpPr>
+        <p:spPr>
+          <a:xfrm>
+            <a:off x="107504" y="6547352"/>
+            <a:ext cx="1656184" cy="365125"/>
+          </a:xfrm>
+        </p:spPr>
+        <p:txBody>
+          <a:bodyPr/>
+          <a:lstStyle/>
+          <a:p>
+            <a:r>
+              <a:rPr lang="fr-FR" dirty="0"/>
+              <a:t>IN52</a:t>
+            </a:r>
+            <a:br>
+              <a:rPr lang="fr-FR" dirty="0"/>
+            </a:br>
+            <a:r>
+              <a:rPr lang="fr-FR" dirty="0"/>
+              <a:t>IN54</a:t>
+            </a:r>
+            <a:br>
+              <a:rPr lang="fr-FR" dirty="0"/>
+            </a:br>
+            <a:endParaRPr lang="fr-FR" dirty="0"/>
+          </a:p>
+        </p:txBody>
+      </p:sp>
+      <p:sp>
+        <p:nvSpPr>
+          <p:cNvPr id="25" name="Espace réservé du pied de page 5">
+            <a:extLst>
+              <a:ext uri="{FF2B5EF4-FFF2-40B4-BE49-F238E27FC236}">
+                <a16:creationId xmlns="" xmlns:a16="http://schemas.microsoft.com/office/drawing/2014/main" id="{78DA7573-D10D-4AEB-96D9-FF4F5408A076}"/>
+              </a:ext>
+            </a:extLst>
+          </p:cNvPr>
+          <p:cNvSpPr>
+            <a:spLocks noGrp="1"/>
+          </p:cNvSpPr>
+          <p:nvPr>
+            <p:ph type="ftr" sz="quarter" idx="3"/>
+          </p:nvPr>
+        </p:nvSpPr>
+        <p:spPr>
+          <a:xfrm>
+            <a:off x="1769087" y="6459892"/>
+            <a:ext cx="5328592" cy="365125"/>
+          </a:xfrm>
+        </p:spPr>
+        <p:txBody>
+          <a:bodyPr/>
+          <a:lstStyle/>
+          <a:p>
+            <a:r>
+              <a:rPr lang="fr-FR"/>
+              <a:t>Mathilde Perrot – Romain Begagnon – Emilien Moncan</a:t>
+            </a:r>
+            <a:br>
+              <a:rPr lang="fr-FR"/>
+            </a:br>
+            <a:r>
+              <a:rPr lang="fr-FR"/>
+              <a:t>Remi Ponnelle – Nahil Zamiati</a:t>
+            </a:r>
+            <a:endParaRPr lang="fr-FR" dirty="0"/>
+          </a:p>
+        </p:txBody>
+      </p:sp>
+    </p:spTree>
+  </p:cSld>
+  <p:clrMapOvr>
+    <a:masterClrMapping/>
+  </p:clrMapOvr>
+</p:sld>
+</file>
+
+<file path=ppt/slides/slide8.xml><?xml version="1.0" encoding="utf-8"?>
+<p:sld xmlns:a="http://schemas.openxmlformats.org/drawingml/2006/main" xmlns:r="http://schemas.openxmlformats.org/officeDocument/2006/relationships" xmlns:p="http://schemas.openxmlformats.org/presentationml/2006/main">
+  <p:cSld>
+    <p:spTree>
+      <p:nvGrpSpPr>
+        <p:cNvPr id="1" name=""/>
+        <p:cNvGrpSpPr/>
+        <p:nvPr/>
+      </p:nvGrpSpPr>
+      <p:grpSpPr>
+        <a:xfrm>
+          <a:off x="0" y="0"/>
+          <a:ext cx="0" cy="0"/>
+          <a:chOff x="0" y="0"/>
+          <a:chExt cx="0" cy="0"/>
+        </a:xfrm>
+      </p:grpSpPr>
+      <p:sp>
+        <p:nvSpPr>
+          <p:cNvPr id="2" name="Titre 1"/>
+          <p:cNvSpPr>
+            <a:spLocks noGrp="1"/>
+          </p:cNvSpPr>
+          <p:nvPr>
+            <p:ph type="title"/>
+          </p:nvPr>
+        </p:nvSpPr>
+        <p:spPr/>
+        <p:txBody>
+          <a:bodyPr/>
+          <a:lstStyle/>
+          <a:p>
+            <a:r>
+              <a:rPr lang="fr-FR" dirty="0" smtClean="0"/>
+              <a:t>II. </a:t>
+            </a:r>
+            <a:r>
+              <a:rPr lang="fr-FR" dirty="0" smtClean="0"/>
+              <a:t>Méthode </a:t>
+            </a:r>
+            <a:r>
+              <a:rPr lang="fr-FR" dirty="0" smtClean="0"/>
+              <a:t>implémentée</a:t>
+            </a:r>
+            <a:endParaRPr lang="fr-FR" dirty="0"/>
+          </a:p>
+        </p:txBody>
+      </p:sp>
+      <p:sp>
+        <p:nvSpPr>
+          <p:cNvPr id="3" name="Espace réservé du contenu 2"/>
+          <p:cNvSpPr>
+            <a:spLocks noGrp="1"/>
+          </p:cNvSpPr>
+          <p:nvPr>
+            <p:ph idx="1"/>
+          </p:nvPr>
+        </p:nvSpPr>
+        <p:spPr>
+          <a:xfrm>
+            <a:off x="457200" y="692696"/>
+            <a:ext cx="8435280" cy="5145435"/>
+          </a:xfrm>
+        </p:spPr>
+        <p:txBody>
+          <a:bodyPr/>
+          <a:lstStyle/>
+          <a:p>
+            <a:pPr>
+              <a:buNone/>
+            </a:pPr>
+            <a:r>
+              <a:rPr lang="fr-FR" dirty="0" smtClean="0"/>
+              <a:t>3) Regroupement et localisation</a:t>
+            </a:r>
+          </a:p>
+          <a:p>
+            <a:pPr>
+              <a:buNone/>
+            </a:pPr>
+            <a:endParaRPr lang="fr-FR" sz="2400" dirty="0"/>
+          </a:p>
+          <a:p>
+            <a:pPr>
+              <a:spcAft>
+                <a:spcPts val="1200"/>
+              </a:spcAft>
+            </a:pPr>
+            <a:r>
+              <a:rPr lang="fr-FR" sz="2400" dirty="0" smtClean="0"/>
+              <a:t>Fermeture morphologique</a:t>
+            </a:r>
+          </a:p>
+          <a:p>
+            <a:pPr>
+              <a:spcAft>
+                <a:spcPts val="1200"/>
+              </a:spcAft>
+            </a:pPr>
+            <a:r>
+              <a:rPr lang="fr-FR" sz="2400" dirty="0" smtClean="0"/>
+              <a:t>Suppression du bruit</a:t>
+            </a:r>
+          </a:p>
+          <a:p>
+            <a:r>
+              <a:rPr lang="fr-FR" sz="2400" dirty="0" smtClean="0"/>
+              <a:t>Définition des rectangles </a:t>
+            </a:r>
+            <a:r>
+              <a:rPr lang="fr-FR" sz="2400" dirty="0" err="1" smtClean="0"/>
+              <a:t>englobants</a:t>
+            </a:r>
+            <a:r>
+              <a:rPr lang="fr-FR" sz="2400" dirty="0" smtClean="0"/>
+              <a:t> </a:t>
+            </a:r>
+            <a:r>
+              <a:rPr lang="fr-FR" sz="2400" dirty="0" smtClean="0">
+                <a:latin typeface="Lucida Sans Unicode"/>
+                <a:cs typeface="Lucida Sans Unicode"/>
+              </a:rPr>
+              <a:t>→ </a:t>
+            </a:r>
+            <a:r>
+              <a:rPr lang="fr-FR" sz="2400" dirty="0" smtClean="0"/>
+              <a:t>Coordonnées (x, y, w, h)</a:t>
+            </a:r>
+          </a:p>
+        </p:txBody>
+      </p:sp>
+      <p:pic>
+        <p:nvPicPr>
+          <p:cNvPr id="5" name="Image 4"/>
+          <p:cNvPicPr/>
+          <p:nvPr/>
+        </p:nvPicPr>
+        <p:blipFill>
+          <a:blip r:embed="rId2" cstate="print"/>
+          <a:srcRect l="1906" r="4692"/>
+          <a:stretch>
+            <a:fillRect/>
+          </a:stretch>
+        </p:blipFill>
+        <p:spPr bwMode="auto">
+          <a:xfrm>
+            <a:off x="539552" y="3851756"/>
+            <a:ext cx="4032448" cy="1800200"/>
+          </a:xfrm>
+          <a:prstGeom prst="rect">
+            <a:avLst/>
+          </a:prstGeom>
+          <a:noFill/>
+          <a:ln w="9525">
+            <a:noFill/>
+            <a:miter lim="800000"/>
+            <a:headEnd/>
+            <a:tailEnd/>
+          </a:ln>
+        </p:spPr>
+      </p:pic>
+      <p:sp>
+        <p:nvSpPr>
+          <p:cNvPr id="6" name="ZoneTexte 5"/>
+          <p:cNvSpPr txBox="1"/>
+          <p:nvPr/>
+        </p:nvSpPr>
+        <p:spPr>
+          <a:xfrm>
+            <a:off x="1835696" y="5651956"/>
+            <a:ext cx="1402948" cy="369332"/>
+          </a:xfrm>
+          <a:prstGeom prst="rect">
+            <a:avLst/>
+          </a:prstGeom>
+          <a:noFill/>
+        </p:spPr>
+        <p:txBody>
+          <a:bodyPr wrap="none" rtlCol="0">
+            <a:spAutoFit/>
+          </a:bodyPr>
+          <a:lstStyle/>
+          <a:p>
+            <a:pPr algn="just"/>
+            <a:r>
+              <a:rPr lang="fr-FR" dirty="0" smtClean="0">
+                <a:solidFill>
+                  <a:schemeClr val="tx1">
+                    <a:lumMod val="75000"/>
+                    <a:lumOff val="25000"/>
+                  </a:schemeClr>
+                </a:solidFill>
+              </a:rPr>
+              <a:t>Masque final</a:t>
+            </a:r>
+            <a:endParaRPr lang="fr-FR" dirty="0">
+              <a:solidFill>
+                <a:schemeClr val="tx1">
+                  <a:lumMod val="75000"/>
+                  <a:lumOff val="25000"/>
+                </a:schemeClr>
+              </a:solidFill>
+            </a:endParaRPr>
+          </a:p>
+        </p:txBody>
+      </p:sp>
+      <p:sp>
+        <p:nvSpPr>
+          <p:cNvPr id="7" name="ZoneTexte 6"/>
+          <p:cNvSpPr txBox="1"/>
+          <p:nvPr/>
+        </p:nvSpPr>
+        <p:spPr>
+          <a:xfrm>
+            <a:off x="5652120" y="5651956"/>
+            <a:ext cx="2285241" cy="369332"/>
+          </a:xfrm>
+          <a:prstGeom prst="rect">
+            <a:avLst/>
+          </a:prstGeom>
+          <a:noFill/>
+        </p:spPr>
+        <p:txBody>
+          <a:bodyPr wrap="none" rtlCol="0">
+            <a:spAutoFit/>
+          </a:bodyPr>
+          <a:lstStyle/>
+          <a:p>
+            <a:pPr algn="just"/>
+            <a:r>
+              <a:rPr lang="fr-FR" dirty="0" smtClean="0">
+                <a:solidFill>
+                  <a:schemeClr val="tx1">
+                    <a:lumMod val="75000"/>
+                    <a:lumOff val="25000"/>
+                  </a:schemeClr>
+                </a:solidFill>
+              </a:rPr>
+              <a:t>Rectangles </a:t>
+            </a:r>
+            <a:r>
+              <a:rPr lang="fr-FR" dirty="0" err="1" smtClean="0">
+                <a:solidFill>
+                  <a:schemeClr val="tx1">
+                    <a:lumMod val="75000"/>
+                    <a:lumOff val="25000"/>
+                  </a:schemeClr>
+                </a:solidFill>
+              </a:rPr>
+              <a:t>englobants</a:t>
+            </a:r>
+            <a:endParaRPr lang="fr-FR" dirty="0">
+              <a:solidFill>
+                <a:schemeClr val="tx1">
+                  <a:lumMod val="75000"/>
+                  <a:lumOff val="25000"/>
+                </a:schemeClr>
+              </a:solidFill>
+            </a:endParaRPr>
+          </a:p>
+        </p:txBody>
+      </p:sp>
+      <p:pic>
+        <p:nvPicPr>
+          <p:cNvPr id="8" name="Image 7"/>
+          <p:cNvPicPr/>
+          <p:nvPr/>
+        </p:nvPicPr>
+        <p:blipFill>
+          <a:blip r:embed="rId3" cstate="print"/>
+          <a:srcRect l="1923" t="8695" r="3846" b="4348"/>
+          <a:stretch>
+            <a:fillRect/>
+          </a:stretch>
+        </p:blipFill>
+        <p:spPr bwMode="auto">
+          <a:xfrm>
+            <a:off x="4788024" y="3851756"/>
+            <a:ext cx="3960440" cy="1800200"/>
+          </a:xfrm>
+          <a:prstGeom prst="rect">
+            <a:avLst/>
+          </a:prstGeom>
+          <a:noFill/>
+          <a:ln w="9525">
+            <a:noFill/>
+            <a:miter lim="800000"/>
+            <a:headEnd/>
+            <a:tailEnd/>
+          </a:ln>
+        </p:spPr>
+      </p:pic>
+      <p:sp>
+        <p:nvSpPr>
+          <p:cNvPr id="10" name="Espace réservé du numéro de diapositive 3">
+            <a:extLst>
+              <a:ext uri="{FF2B5EF4-FFF2-40B4-BE49-F238E27FC236}">
+                <a16:creationId xmlns="" xmlns:a16="http://schemas.microsoft.com/office/drawing/2014/main" id="{548BDFC5-6BC7-471F-83CF-D0E185D5CA6E}"/>
+              </a:ext>
+            </a:extLst>
+          </p:cNvPr>
+          <p:cNvSpPr>
+            <a:spLocks noGrp="1"/>
+          </p:cNvSpPr>
+          <p:nvPr>
+            <p:ph type="sldNum" sz="quarter" idx="4"/>
+          </p:nvPr>
+        </p:nvSpPr>
+        <p:spPr>
+          <a:xfrm>
+            <a:off x="6892822" y="6453336"/>
+            <a:ext cx="2133600" cy="365125"/>
+          </a:xfrm>
+        </p:spPr>
+        <p:txBody>
+          <a:bodyPr/>
+          <a:lstStyle/>
+          <a:p>
+            <a:r>
+              <a:rPr lang="fr-FR"/>
+              <a:t>	</a:t>
+            </a:r>
+            <a:fld id="{09390BE9-E4CD-414E-A8A9-9535CDDB3176}" type="slidenum">
+              <a:rPr lang="fr-FR" sz="2000" smtClean="0"/>
+              <a:pPr/>
+              <a:t>8</a:t>
+            </a:fld>
+            <a:endParaRPr lang="fr-FR" sz="2000" dirty="0"/>
+          </a:p>
+        </p:txBody>
+      </p:sp>
+      <p:sp>
+        <p:nvSpPr>
+          <p:cNvPr id="11" name="Espace réservé de la date 4">
+            <a:extLst>
+              <a:ext uri="{FF2B5EF4-FFF2-40B4-BE49-F238E27FC236}">
+                <a16:creationId xmlns="" xmlns:a16="http://schemas.microsoft.com/office/drawing/2014/main" id="{7DF21FB1-2057-406C-B73E-759C76CCE0D8}"/>
+              </a:ext>
+            </a:extLst>
+          </p:cNvPr>
+          <p:cNvSpPr>
+            <a:spLocks noGrp="1"/>
+          </p:cNvSpPr>
+          <p:nvPr>
+            <p:ph type="dt" sz="half" idx="2"/>
+          </p:nvPr>
+        </p:nvSpPr>
+        <p:spPr>
+          <a:xfrm>
+            <a:off x="107504" y="6547352"/>
+            <a:ext cx="1656184" cy="365125"/>
+          </a:xfrm>
+        </p:spPr>
+        <p:txBody>
+          <a:bodyPr/>
+          <a:lstStyle/>
+          <a:p>
+            <a:r>
+              <a:rPr lang="fr-FR" dirty="0"/>
+              <a:t>IN52</a:t>
+            </a:r>
+            <a:br>
+              <a:rPr lang="fr-FR" dirty="0"/>
+            </a:br>
+            <a:r>
+              <a:rPr lang="fr-FR" dirty="0"/>
+              <a:t>IN54</a:t>
+            </a:r>
+            <a:br>
+              <a:rPr lang="fr-FR" dirty="0"/>
+            </a:br>
+            <a:endParaRPr lang="fr-FR" dirty="0"/>
+          </a:p>
+        </p:txBody>
+      </p:sp>
+      <p:sp>
+        <p:nvSpPr>
+          <p:cNvPr id="12" name="Espace réservé du pied de page 5">
+            <a:extLst>
+              <a:ext uri="{FF2B5EF4-FFF2-40B4-BE49-F238E27FC236}">
+                <a16:creationId xmlns="" xmlns:a16="http://schemas.microsoft.com/office/drawing/2014/main" id="{78DA7573-D10D-4AEB-96D9-FF4F5408A076}"/>
+              </a:ext>
+            </a:extLst>
+          </p:cNvPr>
+          <p:cNvSpPr>
+            <a:spLocks noGrp="1"/>
+          </p:cNvSpPr>
+          <p:nvPr>
+            <p:ph type="ftr" sz="quarter" idx="3"/>
+          </p:nvPr>
+        </p:nvSpPr>
+        <p:spPr>
+          <a:xfrm>
+            <a:off x="1769087" y="6459892"/>
+            <a:ext cx="5328592" cy="365125"/>
+          </a:xfrm>
+        </p:spPr>
+        <p:txBody>
+          <a:bodyPr/>
+          <a:lstStyle/>
+          <a:p>
+            <a:r>
+              <a:rPr lang="fr-FR"/>
+              <a:t>Mathilde Perrot – Romain Begagnon – Emilien Moncan</a:t>
+            </a:r>
+            <a:br>
+              <a:rPr lang="fr-FR"/>
+            </a:br>
+            <a:r>
+              <a:rPr lang="fr-FR"/>
+              <a:t>Remi Ponnelle – Nahil Zamiati</a:t>
+            </a:r>
+            <a:endParaRPr lang="fr-FR" dirty="0"/>
+          </a:p>
+        </p:txBody>
+      </p:sp>
+    </p:spTree>
+  </p:cSld>
+  <p:clrMapOvr>
+    <a:masterClrMapping/>
+  </p:clrMapOvr>
+</p:sld>
+</file>
+
+<file path=ppt/slides/slide9.xml><?xml version="1.0" encoding="utf-8"?>
+<p:sld xmlns:a="http://schemas.openxmlformats.org/drawingml/2006/main" xmlns:r="http://schemas.openxmlformats.org/officeDocument/2006/relationships" xmlns:p="http://schemas.openxmlformats.org/presentationml/2006/main">
+  <p:cSld>
+    <p:spTree>
+      <p:nvGrpSpPr>
+        <p:cNvPr id="1" name=""/>
+        <p:cNvGrpSpPr/>
+        <p:nvPr/>
+      </p:nvGrpSpPr>
+      <p:grpSpPr>
+        <a:xfrm>
+          <a:off x="0" y="0"/>
+          <a:ext cx="0" cy="0"/>
+          <a:chOff x="0" y="0"/>
+          <a:chExt cx="0" cy="0"/>
+        </a:xfrm>
+      </p:grpSpPr>
+      <p:sp>
+        <p:nvSpPr>
+          <p:cNvPr id="2" name="Titre 1"/>
+          <p:cNvSpPr>
+            <a:spLocks noGrp="1"/>
+          </p:cNvSpPr>
+          <p:nvPr>
+            <p:ph type="title"/>
+          </p:nvPr>
+        </p:nvSpPr>
+        <p:spPr/>
+        <p:txBody>
+          <a:bodyPr/>
+          <a:lstStyle/>
+          <a:p>
+            <a:r>
+              <a:rPr lang="fr-FR" dirty="0" smtClean="0"/>
+              <a:t>III. Résultats</a:t>
+            </a:r>
+            <a:endParaRPr lang="fr-FR" dirty="0"/>
+          </a:p>
+        </p:txBody>
+      </p:sp>
+      <p:sp>
+        <p:nvSpPr>
+          <p:cNvPr id="3" name="Espace réservé du contenu 2"/>
+          <p:cNvSpPr>
+            <a:spLocks noGrp="1"/>
+          </p:cNvSpPr>
+          <p:nvPr>
+            <p:ph idx="1"/>
+          </p:nvPr>
+        </p:nvSpPr>
+        <p:spPr/>
+        <p:txBody>
+          <a:bodyPr/>
+          <a:lstStyle/>
+          <a:p>
+            <a:endParaRPr lang="fr-FR"/>
+          </a:p>
+        </p:txBody>
+      </p:sp>
+      <p:sp>
+        <p:nvSpPr>
+          <p:cNvPr id="4" name="Espace réservé du numéro de diapositive 3"/>
+          <p:cNvSpPr>
+            <a:spLocks noGrp="1"/>
+          </p:cNvSpPr>
+          <p:nvPr>
+            <p:ph type="sldNum" sz="quarter" idx="4"/>
+          </p:nvPr>
+        </p:nvSpPr>
+        <p:spPr/>
+        <p:txBody>
+          <a:bodyPr/>
+          <a:lstStyle/>
+          <a:p>
+            <a:r>
+              <a:rPr lang="fr-FR" smtClean="0"/>
+              <a:t>	</a:t>
+            </a:r>
+            <a:fld id="{09390BE9-E4CD-414E-A8A9-9535CDDB3176}" type="slidenum">
+              <a:rPr lang="fr-FR" sz="2000" smtClean="0"/>
+              <a:pPr/>
+              <a:t>9</a:t>
+            </a:fld>
+            <a:endParaRPr lang="fr-FR" sz="2000" dirty="0"/>
+          </a:p>
+        </p:txBody>
+      </p:sp>
+      <p:sp>
+        <p:nvSpPr>
+          <p:cNvPr id="5" name="Espace réservé de la date 4"/>
+          <p:cNvSpPr>
+            <a:spLocks noGrp="1"/>
+          </p:cNvSpPr>
+          <p:nvPr>
+            <p:ph type="dt" sz="half" idx="2"/>
+          </p:nvPr>
+        </p:nvSpPr>
+        <p:spPr/>
+        <p:txBody>
+          <a:bodyPr/>
+          <a:lstStyle/>
+          <a:p>
+            <a:r>
+              <a:rPr lang="fr-FR" smtClean="0"/>
+              <a:t>IN52</a:t>
+            </a:r>
+            <a:br>
+              <a:rPr lang="fr-FR" smtClean="0"/>
+            </a:br>
+            <a:r>
+              <a:rPr lang="fr-FR" smtClean="0"/>
+              <a:t>IN54</a:t>
+            </a:r>
+            <a:br>
+              <a:rPr lang="fr-FR" smtClean="0"/>
+            </a:br>
+            <a:endParaRPr lang="fr-FR" dirty="0"/>
+          </a:p>
+        </p:txBody>
+      </p:sp>
+      <p:sp>
+        <p:nvSpPr>
+          <p:cNvPr id="6" name="Espace réservé du pied de page 5"/>
+          <p:cNvSpPr>
+            <a:spLocks noGrp="1"/>
+          </p:cNvSpPr>
+          <p:nvPr>
+            <p:ph type="ftr" sz="quarter" idx="3"/>
+          </p:nvPr>
+        </p:nvSpPr>
+        <p:spPr/>
+        <p:txBody>
+          <a:bodyPr/>
+          <a:lstStyle/>
+          <a:p>
+            <a:r>
+              <a:rPr lang="fr-FR" smtClean="0"/>
+              <a:t>Mathilde Perrot – Romain Begagnon – Emilien Moncan</a:t>
+            </a:r>
+            <a:br>
+              <a:rPr lang="fr-FR" smtClean="0"/>
+            </a:br>
+            <a:r>
+              <a:rPr lang="fr-FR" smtClean="0"/>
+              <a:t>Remi Ponnelle – Nahil Zamiati</a:t>
+            </a:r>
+            <a:endParaRPr lang="fr-FR" dirty="0"/>
+          </a:p>
+        </p:txBody>
+      </p:sp>
+    </p:spTree>
   </p:cSld>
   <p:clrMapOvr>
     <a:masterClrMapping/>

</xml_diff>